<commit_message>
You can has slides
</commit_message>
<xml_diff>
--- a/Whats the intent with activites.pptx
+++ b/Whats the intent with activites.pptx
@@ -4,8 +4,13 @@
   <p:sldMasterIdLst>
     <p:sldMasterId id="2147483672" r:id="rId1"/>
   </p:sldMasterIdLst>
+  <p:notesMasterIdLst>
+    <p:notesMasterId r:id="rId5"/>
+  </p:notesMasterIdLst>
   <p:sldIdLst>
     <p:sldId id="256" r:id="rId2"/>
+    <p:sldId id="257" r:id="rId3"/>
+    <p:sldId id="258" r:id="rId4"/>
   </p:sldIdLst>
   <p:sldSz cx="9144000" cy="6858000" type="screen4x3"/>
   <p:notesSz cx="6858000" cy="9144000"/>
@@ -144,6 +149,440 @@
     </a:lvl9pPr>
   </p:defaultTextStyle>
 </p:presentation>
+</file>
+
+<file path=ppt/notesMasters/notesMaster1.xml><?xml version="1.0" encoding="utf-8"?>
+<p:notesMaster xmlns:a="http://schemas.openxmlformats.org/drawingml/2006/main" xmlns:r="http://schemas.openxmlformats.org/officeDocument/2006/relationships" xmlns:p="http://schemas.openxmlformats.org/presentationml/2006/main">
+  <p:cSld>
+    <p:bg>
+      <p:bgRef idx="1001">
+        <a:schemeClr val="bg1"/>
+      </p:bgRef>
+    </p:bg>
+    <p:spTree>
+      <p:nvGrpSpPr>
+        <p:cNvPr id="1" name=""/>
+        <p:cNvGrpSpPr/>
+        <p:nvPr/>
+      </p:nvGrpSpPr>
+      <p:grpSpPr>
+        <a:xfrm>
+          <a:off x="0" y="0"/>
+          <a:ext cx="0" cy="0"/>
+          <a:chOff x="0" y="0"/>
+          <a:chExt cx="0" cy="0"/>
+        </a:xfrm>
+      </p:grpSpPr>
+      <p:sp>
+        <p:nvSpPr>
+          <p:cNvPr id="2" name="Header Placeholder 1"/>
+          <p:cNvSpPr>
+            <a:spLocks noGrp="1"/>
+          </p:cNvSpPr>
+          <p:nvPr>
+            <p:ph type="hdr" sz="quarter"/>
+          </p:nvPr>
+        </p:nvSpPr>
+        <p:spPr>
+          <a:xfrm>
+            <a:off x="0" y="0"/>
+            <a:ext cx="2971800" cy="457200"/>
+          </a:xfrm>
+          <a:prstGeom prst="rect">
+            <a:avLst/>
+          </a:prstGeom>
+        </p:spPr>
+        <p:txBody>
+          <a:bodyPr vert="horz" lIns="91440" tIns="45720" rIns="91440" bIns="45720" rtlCol="0"/>
+          <a:lstStyle>
+            <a:lvl1pPr algn="l">
+              <a:defRPr sz="1200"/>
+            </a:lvl1pPr>
+          </a:lstStyle>
+          <a:p>
+            <a:endParaRPr lang="sv-SE"/>
+          </a:p>
+        </p:txBody>
+      </p:sp>
+      <p:sp>
+        <p:nvSpPr>
+          <p:cNvPr id="3" name="Date Placeholder 2"/>
+          <p:cNvSpPr>
+            <a:spLocks noGrp="1"/>
+          </p:cNvSpPr>
+          <p:nvPr>
+            <p:ph type="dt" idx="1"/>
+          </p:nvPr>
+        </p:nvSpPr>
+        <p:spPr>
+          <a:xfrm>
+            <a:off x="3884613" y="0"/>
+            <a:ext cx="2971800" cy="457200"/>
+          </a:xfrm>
+          <a:prstGeom prst="rect">
+            <a:avLst/>
+          </a:prstGeom>
+        </p:spPr>
+        <p:txBody>
+          <a:bodyPr vert="horz" lIns="91440" tIns="45720" rIns="91440" bIns="45720" rtlCol="0"/>
+          <a:lstStyle>
+            <a:lvl1pPr algn="r">
+              <a:defRPr sz="1200"/>
+            </a:lvl1pPr>
+          </a:lstStyle>
+          <a:p>
+            <a:fld id="{FA6D979C-6CDC-4C22-9F0D-CDB89CF792FD}" type="datetimeFigureOut">
+              <a:rPr lang="sv-SE" smtClean="0"/>
+              <a:t>2011-09-18</a:t>
+            </a:fld>
+            <a:endParaRPr lang="sv-SE"/>
+          </a:p>
+        </p:txBody>
+      </p:sp>
+      <p:sp>
+        <p:nvSpPr>
+          <p:cNvPr id="4" name="Slide Image Placeholder 3"/>
+          <p:cNvSpPr>
+            <a:spLocks noGrp="1" noRot="1" noChangeAspect="1"/>
+          </p:cNvSpPr>
+          <p:nvPr>
+            <p:ph type="sldImg" idx="2"/>
+          </p:nvPr>
+        </p:nvSpPr>
+        <p:spPr>
+          <a:xfrm>
+            <a:off x="1143000" y="685800"/>
+            <a:ext cx="4572000" cy="3429000"/>
+          </a:xfrm>
+          <a:prstGeom prst="rect">
+            <a:avLst/>
+          </a:prstGeom>
+          <a:noFill/>
+          <a:ln w="12700">
+            <a:solidFill>
+              <a:prstClr val="black"/>
+            </a:solidFill>
+          </a:ln>
+        </p:spPr>
+        <p:txBody>
+          <a:bodyPr vert="horz" lIns="91440" tIns="45720" rIns="91440" bIns="45720" rtlCol="0" anchor="ctr"/>
+          <a:lstStyle/>
+          <a:p>
+            <a:endParaRPr lang="sv-SE"/>
+          </a:p>
+        </p:txBody>
+      </p:sp>
+      <p:sp>
+        <p:nvSpPr>
+          <p:cNvPr id="5" name="Notes Placeholder 4"/>
+          <p:cNvSpPr>
+            <a:spLocks noGrp="1"/>
+          </p:cNvSpPr>
+          <p:nvPr>
+            <p:ph type="body" sz="quarter" idx="3"/>
+          </p:nvPr>
+        </p:nvSpPr>
+        <p:spPr>
+          <a:xfrm>
+            <a:off x="685800" y="4343400"/>
+            <a:ext cx="5486400" cy="4114800"/>
+          </a:xfrm>
+          <a:prstGeom prst="rect">
+            <a:avLst/>
+          </a:prstGeom>
+        </p:spPr>
+        <p:txBody>
+          <a:bodyPr vert="horz" lIns="91440" tIns="45720" rIns="91440" bIns="45720" rtlCol="0"/>
+          <a:lstStyle/>
+          <a:p>
+            <a:pPr lvl="0"/>
+            <a:r>
+              <a:rPr lang="en-US" smtClean="0"/>
+              <a:t>Click to edit Master text styles</a:t>
+            </a:r>
+          </a:p>
+          <a:p>
+            <a:pPr lvl="1"/>
+            <a:r>
+              <a:rPr lang="en-US" smtClean="0"/>
+              <a:t>Second level</a:t>
+            </a:r>
+          </a:p>
+          <a:p>
+            <a:pPr lvl="2"/>
+            <a:r>
+              <a:rPr lang="en-US" smtClean="0"/>
+              <a:t>Third level</a:t>
+            </a:r>
+          </a:p>
+          <a:p>
+            <a:pPr lvl="3"/>
+            <a:r>
+              <a:rPr lang="en-US" smtClean="0"/>
+              <a:t>Fourth level</a:t>
+            </a:r>
+          </a:p>
+          <a:p>
+            <a:pPr lvl="4"/>
+            <a:r>
+              <a:rPr lang="en-US" smtClean="0"/>
+              <a:t>Fifth level</a:t>
+            </a:r>
+            <a:endParaRPr lang="sv-SE"/>
+          </a:p>
+        </p:txBody>
+      </p:sp>
+      <p:sp>
+        <p:nvSpPr>
+          <p:cNvPr id="6" name="Footer Placeholder 5"/>
+          <p:cNvSpPr>
+            <a:spLocks noGrp="1"/>
+          </p:cNvSpPr>
+          <p:nvPr>
+            <p:ph type="ftr" sz="quarter" idx="4"/>
+          </p:nvPr>
+        </p:nvSpPr>
+        <p:spPr>
+          <a:xfrm>
+            <a:off x="0" y="8685213"/>
+            <a:ext cx="2971800" cy="457200"/>
+          </a:xfrm>
+          <a:prstGeom prst="rect">
+            <a:avLst/>
+          </a:prstGeom>
+        </p:spPr>
+        <p:txBody>
+          <a:bodyPr vert="horz" lIns="91440" tIns="45720" rIns="91440" bIns="45720" rtlCol="0" anchor="b"/>
+          <a:lstStyle>
+            <a:lvl1pPr algn="l">
+              <a:defRPr sz="1200"/>
+            </a:lvl1pPr>
+          </a:lstStyle>
+          <a:p>
+            <a:endParaRPr lang="sv-SE"/>
+          </a:p>
+        </p:txBody>
+      </p:sp>
+      <p:sp>
+        <p:nvSpPr>
+          <p:cNvPr id="7" name="Slide Number Placeholder 6"/>
+          <p:cNvSpPr>
+            <a:spLocks noGrp="1"/>
+          </p:cNvSpPr>
+          <p:nvPr>
+            <p:ph type="sldNum" sz="quarter" idx="5"/>
+          </p:nvPr>
+        </p:nvSpPr>
+        <p:spPr>
+          <a:xfrm>
+            <a:off x="3884613" y="8685213"/>
+            <a:ext cx="2971800" cy="457200"/>
+          </a:xfrm>
+          <a:prstGeom prst="rect">
+            <a:avLst/>
+          </a:prstGeom>
+        </p:spPr>
+        <p:txBody>
+          <a:bodyPr vert="horz" lIns="91440" tIns="45720" rIns="91440" bIns="45720" rtlCol="0" anchor="b"/>
+          <a:lstStyle>
+            <a:lvl1pPr algn="r">
+              <a:defRPr sz="1200"/>
+            </a:lvl1pPr>
+          </a:lstStyle>
+          <a:p>
+            <a:fld id="{4AC1C784-466F-4ABA-A6E5-D6D202D28610}" type="slidenum">
+              <a:rPr lang="sv-SE" smtClean="0"/>
+              <a:t>‹#›</a:t>
+            </a:fld>
+            <a:endParaRPr lang="sv-SE"/>
+          </a:p>
+        </p:txBody>
+      </p:sp>
+    </p:spTree>
+    <p:extLst>
+      <p:ext uri="{BB962C8B-B14F-4D97-AF65-F5344CB8AC3E}">
+        <p14:creationId xmlns:p14="http://schemas.microsoft.com/office/powerpoint/2010/main" val="1791644492"/>
+      </p:ext>
+    </p:extLst>
+  </p:cSld>
+  <p:clrMap bg1="lt1" tx1="dk1" bg2="lt2" tx2="dk2" accent1="accent1" accent2="accent2" accent3="accent3" accent4="accent4" accent5="accent5" accent6="accent6" hlink="hlink" folHlink="folHlink"/>
+  <p:notesStyle>
+    <a:lvl1pPr marL="0" algn="l" defTabSz="914400" rtl="0" eaLnBrk="1" latinLnBrk="0" hangingPunct="1">
+      <a:defRPr sz="1200" kern="1200">
+        <a:solidFill>
+          <a:schemeClr val="tx1"/>
+        </a:solidFill>
+        <a:latin typeface="+mn-lt"/>
+        <a:ea typeface="+mn-ea"/>
+        <a:cs typeface="+mn-cs"/>
+      </a:defRPr>
+    </a:lvl1pPr>
+    <a:lvl2pPr marL="457200" algn="l" defTabSz="914400" rtl="0" eaLnBrk="1" latinLnBrk="0" hangingPunct="1">
+      <a:defRPr sz="1200" kern="1200">
+        <a:solidFill>
+          <a:schemeClr val="tx1"/>
+        </a:solidFill>
+        <a:latin typeface="+mn-lt"/>
+        <a:ea typeface="+mn-ea"/>
+        <a:cs typeface="+mn-cs"/>
+      </a:defRPr>
+    </a:lvl2pPr>
+    <a:lvl3pPr marL="914400" algn="l" defTabSz="914400" rtl="0" eaLnBrk="1" latinLnBrk="0" hangingPunct="1">
+      <a:defRPr sz="1200" kern="1200">
+        <a:solidFill>
+          <a:schemeClr val="tx1"/>
+        </a:solidFill>
+        <a:latin typeface="+mn-lt"/>
+        <a:ea typeface="+mn-ea"/>
+        <a:cs typeface="+mn-cs"/>
+      </a:defRPr>
+    </a:lvl3pPr>
+    <a:lvl4pPr marL="1371600" algn="l" defTabSz="914400" rtl="0" eaLnBrk="1" latinLnBrk="0" hangingPunct="1">
+      <a:defRPr sz="1200" kern="1200">
+        <a:solidFill>
+          <a:schemeClr val="tx1"/>
+        </a:solidFill>
+        <a:latin typeface="+mn-lt"/>
+        <a:ea typeface="+mn-ea"/>
+        <a:cs typeface="+mn-cs"/>
+      </a:defRPr>
+    </a:lvl4pPr>
+    <a:lvl5pPr marL="1828800" algn="l" defTabSz="914400" rtl="0" eaLnBrk="1" latinLnBrk="0" hangingPunct="1">
+      <a:defRPr sz="1200" kern="1200">
+        <a:solidFill>
+          <a:schemeClr val="tx1"/>
+        </a:solidFill>
+        <a:latin typeface="+mn-lt"/>
+        <a:ea typeface="+mn-ea"/>
+        <a:cs typeface="+mn-cs"/>
+      </a:defRPr>
+    </a:lvl5pPr>
+    <a:lvl6pPr marL="2286000" algn="l" defTabSz="914400" rtl="0" eaLnBrk="1" latinLnBrk="0" hangingPunct="1">
+      <a:defRPr sz="1200" kern="1200">
+        <a:solidFill>
+          <a:schemeClr val="tx1"/>
+        </a:solidFill>
+        <a:latin typeface="+mn-lt"/>
+        <a:ea typeface="+mn-ea"/>
+        <a:cs typeface="+mn-cs"/>
+      </a:defRPr>
+    </a:lvl6pPr>
+    <a:lvl7pPr marL="2743200" algn="l" defTabSz="914400" rtl="0" eaLnBrk="1" latinLnBrk="0" hangingPunct="1">
+      <a:defRPr sz="1200" kern="1200">
+        <a:solidFill>
+          <a:schemeClr val="tx1"/>
+        </a:solidFill>
+        <a:latin typeface="+mn-lt"/>
+        <a:ea typeface="+mn-ea"/>
+        <a:cs typeface="+mn-cs"/>
+      </a:defRPr>
+    </a:lvl7pPr>
+    <a:lvl8pPr marL="3200400" algn="l" defTabSz="914400" rtl="0" eaLnBrk="1" latinLnBrk="0" hangingPunct="1">
+      <a:defRPr sz="1200" kern="1200">
+        <a:solidFill>
+          <a:schemeClr val="tx1"/>
+        </a:solidFill>
+        <a:latin typeface="+mn-lt"/>
+        <a:ea typeface="+mn-ea"/>
+        <a:cs typeface="+mn-cs"/>
+      </a:defRPr>
+    </a:lvl8pPr>
+    <a:lvl9pPr marL="3657600" algn="l" defTabSz="914400" rtl="0" eaLnBrk="1" latinLnBrk="0" hangingPunct="1">
+      <a:defRPr sz="1200" kern="1200">
+        <a:solidFill>
+          <a:schemeClr val="tx1"/>
+        </a:solidFill>
+        <a:latin typeface="+mn-lt"/>
+        <a:ea typeface="+mn-ea"/>
+        <a:cs typeface="+mn-cs"/>
+      </a:defRPr>
+    </a:lvl9pPr>
+  </p:notesStyle>
+</p:notesMaster>
+</file>
+
+<file path=ppt/notesSlides/notesSlide1.xml><?xml version="1.0" encoding="utf-8"?>
+<p:notes xmlns:a="http://schemas.openxmlformats.org/drawingml/2006/main" xmlns:r="http://schemas.openxmlformats.org/officeDocument/2006/relationships" xmlns:p="http://schemas.openxmlformats.org/presentationml/2006/main">
+  <p:cSld>
+    <p:spTree>
+      <p:nvGrpSpPr>
+        <p:cNvPr id="1" name=""/>
+        <p:cNvGrpSpPr/>
+        <p:nvPr/>
+      </p:nvGrpSpPr>
+      <p:grpSpPr>
+        <a:xfrm>
+          <a:off x="0" y="0"/>
+          <a:ext cx="0" cy="0"/>
+          <a:chOff x="0" y="0"/>
+          <a:chExt cx="0" cy="0"/>
+        </a:xfrm>
+      </p:grpSpPr>
+      <p:sp>
+        <p:nvSpPr>
+          <p:cNvPr id="2" name="Slide Image Placeholder 1"/>
+          <p:cNvSpPr>
+            <a:spLocks noGrp="1" noRot="1" noChangeAspect="1"/>
+          </p:cNvSpPr>
+          <p:nvPr>
+            <p:ph type="sldImg"/>
+          </p:nvPr>
+        </p:nvSpPr>
+        <p:spPr/>
+      </p:sp>
+      <p:sp>
+        <p:nvSpPr>
+          <p:cNvPr id="3" name="Notes Placeholder 2"/>
+          <p:cNvSpPr>
+            <a:spLocks noGrp="1"/>
+          </p:cNvSpPr>
+          <p:nvPr>
+            <p:ph type="body" idx="1"/>
+          </p:nvPr>
+        </p:nvSpPr>
+        <p:spPr/>
+        <p:txBody>
+          <a:bodyPr/>
+          <a:lstStyle/>
+          <a:p>
+            <a:endParaRPr lang="sv-SE" dirty="0"/>
+          </a:p>
+        </p:txBody>
+      </p:sp>
+      <p:sp>
+        <p:nvSpPr>
+          <p:cNvPr id="4" name="Slide Number Placeholder 3"/>
+          <p:cNvSpPr>
+            <a:spLocks noGrp="1"/>
+          </p:cNvSpPr>
+          <p:nvPr>
+            <p:ph type="sldNum" sz="quarter" idx="10"/>
+          </p:nvPr>
+        </p:nvSpPr>
+        <p:spPr/>
+        <p:txBody>
+          <a:bodyPr/>
+          <a:lstStyle/>
+          <a:p>
+            <a:fld id="{4AC1C784-466F-4ABA-A6E5-D6D202D28610}" type="slidenum">
+              <a:rPr lang="sv-SE" smtClean="0"/>
+              <a:t>2</a:t>
+            </a:fld>
+            <a:endParaRPr lang="sv-SE"/>
+          </a:p>
+        </p:txBody>
+      </p:sp>
+    </p:spTree>
+    <p:extLst>
+      <p:ext uri="{BB962C8B-B14F-4D97-AF65-F5344CB8AC3E}">
+        <p14:creationId xmlns:p14="http://schemas.microsoft.com/office/powerpoint/2010/main" val="533877379"/>
+      </p:ext>
+    </p:extLst>
+  </p:cSld>
+  <p:clrMapOvr>
+    <a:masterClrMapping/>
+  </p:clrMapOvr>
+</p:notes>
 </file>
 
 <file path=ppt/slideLayouts/slideLayout1.xml><?xml version="1.0" encoding="utf-8"?>
@@ -2628,6 +3067,7 @@
           <a:bodyPr/>
           <a:lstStyle/>
           <a:p>
+            <a:pPr algn="ctr"/>
             <a:r>
               <a:rPr lang="sv-SE" dirty="0" smtClean="0"/>
               <a:t>Whats the intent with activites?</a:t>
@@ -2652,10 +3092,10 @@
           <a:lstStyle/>
           <a:p>
             <a:r>
-              <a:rPr lang="sv-SE" smtClean="0"/>
+              <a:rPr lang="sv-SE" dirty="0" smtClean="0"/>
               <a:t>Android stuffs</a:t>
             </a:r>
-            <a:endParaRPr lang="sv-SE"/>
+            <a:endParaRPr lang="sv-SE" dirty="0"/>
           </a:p>
         </p:txBody>
       </p:sp>
@@ -2663,6 +3103,177 @@
     <p:extLst>
       <p:ext uri="{BB962C8B-B14F-4D97-AF65-F5344CB8AC3E}">
         <p14:creationId xmlns:p14="http://schemas.microsoft.com/office/powerpoint/2010/main" val="1932908919"/>
+      </p:ext>
+    </p:extLst>
+  </p:cSld>
+  <p:clrMapOvr>
+    <a:masterClrMapping/>
+  </p:clrMapOvr>
+  <p:transition/>
+</p:sld>
+</file>
+
+<file path=ppt/slides/slide2.xml><?xml version="1.0" encoding="utf-8"?>
+<p:sld xmlns:a="http://schemas.openxmlformats.org/drawingml/2006/main" xmlns:r="http://schemas.openxmlformats.org/officeDocument/2006/relationships" xmlns:p="http://schemas.openxmlformats.org/presentationml/2006/main">
+  <p:cSld>
+    <p:spTree>
+      <p:nvGrpSpPr>
+        <p:cNvPr id="1" name=""/>
+        <p:cNvGrpSpPr/>
+        <p:nvPr/>
+      </p:nvGrpSpPr>
+      <p:grpSpPr>
+        <a:xfrm>
+          <a:off x="0" y="0"/>
+          <a:ext cx="0" cy="0"/>
+          <a:chOff x="0" y="0"/>
+          <a:chExt cx="0" cy="0"/>
+        </a:xfrm>
+      </p:grpSpPr>
+      <p:sp>
+        <p:nvSpPr>
+          <p:cNvPr id="2" name="Title 1"/>
+          <p:cNvSpPr>
+            <a:spLocks noGrp="1"/>
+          </p:cNvSpPr>
+          <p:nvPr>
+            <p:ph type="title"/>
+          </p:nvPr>
+        </p:nvSpPr>
+        <p:spPr/>
+        <p:txBody>
+          <a:bodyPr/>
+          <a:lstStyle/>
+          <a:p>
+            <a:r>
+              <a:rPr lang="sv-SE" dirty="0" smtClean="0"/>
+              <a:t>Android</a:t>
+            </a:r>
+            <a:endParaRPr lang="sv-SE" dirty="0"/>
+          </a:p>
+        </p:txBody>
+      </p:sp>
+      <p:pic>
+        <p:nvPicPr>
+          <p:cNvPr id="4" name="Content Placeholder 3">
+            <a:hlinkClick r:id="rId3"/>
+          </p:cNvPr>
+          <p:cNvPicPr>
+            <a:picLocks noGrp="1" noChangeAspect="1"/>
+          </p:cNvPicPr>
+          <p:nvPr>
+            <p:ph idx="1"/>
+          </p:nvPr>
+        </p:nvPicPr>
+        <p:blipFill>
+          <a:blip r:embed="rId4">
+            <a:extLst>
+              <a:ext uri="{28A0092B-C50C-407E-A947-70E740481C1C}">
+                <a14:useLocalDpi xmlns:a14="http://schemas.microsoft.com/office/drawing/2010/main" val="0"/>
+              </a:ext>
+            </a:extLst>
+          </a:blip>
+          <a:stretch>
+            <a:fillRect/>
+          </a:stretch>
+        </p:blipFill>
+        <p:spPr>
+          <a:xfrm>
+            <a:off x="1930400" y="1943100"/>
+            <a:ext cx="5283200" cy="2971800"/>
+          </a:xfrm>
+        </p:spPr>
+      </p:pic>
+    </p:spTree>
+    <p:extLst>
+      <p:ext uri="{BB962C8B-B14F-4D97-AF65-F5344CB8AC3E}">
+        <p14:creationId xmlns:p14="http://schemas.microsoft.com/office/powerpoint/2010/main" val="254887434"/>
+      </p:ext>
+    </p:extLst>
+  </p:cSld>
+  <p:clrMapOvr>
+    <a:masterClrMapping/>
+  </p:clrMapOvr>
+  <p:transition/>
+</p:sld>
+</file>
+
+<file path=ppt/slides/slide3.xml><?xml version="1.0" encoding="utf-8"?>
+<p:sld xmlns:a="http://schemas.openxmlformats.org/drawingml/2006/main" xmlns:r="http://schemas.openxmlformats.org/officeDocument/2006/relationships" xmlns:p="http://schemas.openxmlformats.org/presentationml/2006/main">
+  <p:cSld>
+    <p:spTree>
+      <p:nvGrpSpPr>
+        <p:cNvPr id="1" name=""/>
+        <p:cNvGrpSpPr/>
+        <p:nvPr/>
+      </p:nvGrpSpPr>
+      <p:grpSpPr>
+        <a:xfrm>
+          <a:off x="0" y="0"/>
+          <a:ext cx="0" cy="0"/>
+          <a:chOff x="0" y="0"/>
+          <a:chExt cx="0" cy="0"/>
+        </a:xfrm>
+      </p:grpSpPr>
+      <p:sp>
+        <p:nvSpPr>
+          <p:cNvPr id="2" name="Title 1"/>
+          <p:cNvSpPr>
+            <a:spLocks noGrp="1"/>
+          </p:cNvSpPr>
+          <p:nvPr>
+            <p:ph type="title"/>
+          </p:nvPr>
+        </p:nvSpPr>
+        <p:spPr/>
+        <p:txBody>
+          <a:bodyPr/>
+          <a:lstStyle/>
+          <a:p>
+            <a:r>
+              <a:rPr lang="sv-SE" dirty="0" smtClean="0"/>
+              <a:t>Questions?</a:t>
+            </a:r>
+            <a:br>
+              <a:rPr lang="sv-SE" dirty="0" smtClean="0"/>
+            </a:br>
+            <a:endParaRPr lang="sv-SE" dirty="0"/>
+          </a:p>
+        </p:txBody>
+      </p:sp>
+      <p:pic>
+        <p:nvPicPr>
+          <p:cNvPr id="4" name="Content Placeholder 3"/>
+          <p:cNvPicPr>
+            <a:picLocks noGrp="1" noChangeAspect="1"/>
+          </p:cNvPicPr>
+          <p:nvPr>
+            <p:ph idx="1"/>
+          </p:nvPr>
+        </p:nvPicPr>
+        <p:blipFill>
+          <a:blip r:embed="rId2" cstate="print">
+            <a:extLst>
+              <a:ext uri="{28A0092B-C50C-407E-A947-70E740481C1C}">
+                <a14:useLocalDpi xmlns:a14="http://schemas.microsoft.com/office/drawing/2010/main" val="0"/>
+              </a:ext>
+            </a:extLst>
+          </a:blip>
+          <a:stretch>
+            <a:fillRect/>
+          </a:stretch>
+        </p:blipFill>
+        <p:spPr>
+          <a:xfrm>
+            <a:off x="683568" y="1268760"/>
+            <a:ext cx="7776864" cy="4860540"/>
+          </a:xfrm>
+        </p:spPr>
+      </p:pic>
+    </p:spTree>
+    <p:extLst>
+      <p:ext uri="{BB962C8B-B14F-4D97-AF65-F5344CB8AC3E}">
+        <p14:creationId xmlns:p14="http://schemas.microsoft.com/office/powerpoint/2010/main" val="4019115078"/>
       </p:ext>
     </p:extLst>
   </p:cSld>
@@ -3091,4 +3702,289 @@
     </a:extraClrScheme>
   </a:extraClrSchemeLst>
 </a:theme>
+</file>
+
+<file path=ppt/theme/theme2.xml><?xml version="1.0" encoding="utf-8"?>
+<a:theme xmlns:a="http://schemas.openxmlformats.org/drawingml/2006/main" name="Office Theme">
+  <a:themeElements>
+    <a:clrScheme name="Office">
+      <a:dk1>
+        <a:sysClr val="windowText" lastClr="000000"/>
+      </a:dk1>
+      <a:lt1>
+        <a:sysClr val="window" lastClr="FFFFFF"/>
+      </a:lt1>
+      <a:dk2>
+        <a:srgbClr val="1F497D"/>
+      </a:dk2>
+      <a:lt2>
+        <a:srgbClr val="EEECE1"/>
+      </a:lt2>
+      <a:accent1>
+        <a:srgbClr val="4F81BD"/>
+      </a:accent1>
+      <a:accent2>
+        <a:srgbClr val="C0504D"/>
+      </a:accent2>
+      <a:accent3>
+        <a:srgbClr val="9BBB59"/>
+      </a:accent3>
+      <a:accent4>
+        <a:srgbClr val="8064A2"/>
+      </a:accent4>
+      <a:accent5>
+        <a:srgbClr val="4BACC6"/>
+      </a:accent5>
+      <a:accent6>
+        <a:srgbClr val="F79646"/>
+      </a:accent6>
+      <a:hlink>
+        <a:srgbClr val="0000FF"/>
+      </a:hlink>
+      <a:folHlink>
+        <a:srgbClr val="800080"/>
+      </a:folHlink>
+    </a:clrScheme>
+    <a:fontScheme name="Office">
+      <a:majorFont>
+        <a:latin typeface="Calibri"/>
+        <a:ea typeface=""/>
+        <a:cs typeface=""/>
+        <a:font script="Jpan" typeface="ＭＳ Ｐゴシック"/>
+        <a:font script="Hang" typeface="맑은 고딕"/>
+        <a:font script="Hans" typeface="宋体"/>
+        <a:font script="Hant" typeface="新細明體"/>
+        <a:font script="Arab" typeface="Times New Roman"/>
+        <a:font script="Hebr" typeface="Times New Roman"/>
+        <a:font script="Thai" typeface="Angsana New"/>
+        <a:font script="Ethi" typeface="Nyala"/>
+        <a:font script="Beng" typeface="Vrinda"/>
+        <a:font script="Gujr" typeface="Shruti"/>
+        <a:font script="Khmr" typeface="MoolBoran"/>
+        <a:font script="Knda" typeface="Tunga"/>
+        <a:font script="Guru" typeface="Raavi"/>
+        <a:font script="Cans" typeface="Euphemia"/>
+        <a:font script="Cher" typeface="Plantagenet Cherokee"/>
+        <a:font script="Yiii" typeface="Microsoft Yi Baiti"/>
+        <a:font script="Tibt" typeface="Microsoft Himalaya"/>
+        <a:font script="Thaa" typeface="MV Boli"/>
+        <a:font script="Deva" typeface="Mangal"/>
+        <a:font script="Telu" typeface="Gautami"/>
+        <a:font script="Taml" typeface="Latha"/>
+        <a:font script="Syrc" typeface="Estrangelo Edessa"/>
+        <a:font script="Orya" typeface="Kalinga"/>
+        <a:font script="Mlym" typeface="Kartika"/>
+        <a:font script="Laoo" typeface="DokChampa"/>
+        <a:font script="Sinh" typeface="Iskoola Pota"/>
+        <a:font script="Mong" typeface="Mongolian Baiti"/>
+        <a:font script="Viet" typeface="Times New Roman"/>
+        <a:font script="Uigh" typeface="Microsoft Uighur"/>
+        <a:font script="Geor" typeface="Sylfaen"/>
+      </a:majorFont>
+      <a:minorFont>
+        <a:latin typeface="Calibri"/>
+        <a:ea typeface=""/>
+        <a:cs typeface=""/>
+        <a:font script="Jpan" typeface="ＭＳ Ｐゴシック"/>
+        <a:font script="Hang" typeface="맑은 고딕"/>
+        <a:font script="Hans" typeface="宋体"/>
+        <a:font script="Hant" typeface="新細明體"/>
+        <a:font script="Arab" typeface="Arial"/>
+        <a:font script="Hebr" typeface="Arial"/>
+        <a:font script="Thai" typeface="Cordia New"/>
+        <a:font script="Ethi" typeface="Nyala"/>
+        <a:font script="Beng" typeface="Vrinda"/>
+        <a:font script="Gujr" typeface="Shruti"/>
+        <a:font script="Khmr" typeface="DaunPenh"/>
+        <a:font script="Knda" typeface="Tunga"/>
+        <a:font script="Guru" typeface="Raavi"/>
+        <a:font script="Cans" typeface="Euphemia"/>
+        <a:font script="Cher" typeface="Plantagenet Cherokee"/>
+        <a:font script="Yiii" typeface="Microsoft Yi Baiti"/>
+        <a:font script="Tibt" typeface="Microsoft Himalaya"/>
+        <a:font script="Thaa" typeface="MV Boli"/>
+        <a:font script="Deva" typeface="Mangal"/>
+        <a:font script="Telu" typeface="Gautami"/>
+        <a:font script="Taml" typeface="Latha"/>
+        <a:font script="Syrc" typeface="Estrangelo Edessa"/>
+        <a:font script="Orya" typeface="Kalinga"/>
+        <a:font script="Mlym" typeface="Kartika"/>
+        <a:font script="Laoo" typeface="DokChampa"/>
+        <a:font script="Sinh" typeface="Iskoola Pota"/>
+        <a:font script="Mong" typeface="Mongolian Baiti"/>
+        <a:font script="Viet" typeface="Arial"/>
+        <a:font script="Uigh" typeface="Microsoft Uighur"/>
+        <a:font script="Geor" typeface="Sylfaen"/>
+      </a:minorFont>
+    </a:fontScheme>
+    <a:fmtScheme name="Office">
+      <a:fillStyleLst>
+        <a:solidFill>
+          <a:schemeClr val="phClr"/>
+        </a:solidFill>
+        <a:gradFill rotWithShape="1">
+          <a:gsLst>
+            <a:gs pos="0">
+              <a:schemeClr val="phClr">
+                <a:tint val="50000"/>
+                <a:satMod val="300000"/>
+              </a:schemeClr>
+            </a:gs>
+            <a:gs pos="35000">
+              <a:schemeClr val="phClr">
+                <a:tint val="37000"/>
+                <a:satMod val="300000"/>
+              </a:schemeClr>
+            </a:gs>
+            <a:gs pos="100000">
+              <a:schemeClr val="phClr">
+                <a:tint val="15000"/>
+                <a:satMod val="350000"/>
+              </a:schemeClr>
+            </a:gs>
+          </a:gsLst>
+          <a:lin ang="16200000" scaled="1"/>
+        </a:gradFill>
+        <a:gradFill rotWithShape="1">
+          <a:gsLst>
+            <a:gs pos="0">
+              <a:schemeClr val="phClr">
+                <a:shade val="51000"/>
+                <a:satMod val="130000"/>
+              </a:schemeClr>
+            </a:gs>
+            <a:gs pos="80000">
+              <a:schemeClr val="phClr">
+                <a:shade val="93000"/>
+                <a:satMod val="130000"/>
+              </a:schemeClr>
+            </a:gs>
+            <a:gs pos="100000">
+              <a:schemeClr val="phClr">
+                <a:shade val="94000"/>
+                <a:satMod val="135000"/>
+              </a:schemeClr>
+            </a:gs>
+          </a:gsLst>
+          <a:lin ang="16200000" scaled="0"/>
+        </a:gradFill>
+      </a:fillStyleLst>
+      <a:lnStyleLst>
+        <a:ln w="9525" cap="flat" cmpd="sng" algn="ctr">
+          <a:solidFill>
+            <a:schemeClr val="phClr">
+              <a:shade val="95000"/>
+              <a:satMod val="105000"/>
+            </a:schemeClr>
+          </a:solidFill>
+          <a:prstDash val="solid"/>
+        </a:ln>
+        <a:ln w="25400" cap="flat" cmpd="sng" algn="ctr">
+          <a:solidFill>
+            <a:schemeClr val="phClr"/>
+          </a:solidFill>
+          <a:prstDash val="solid"/>
+        </a:ln>
+        <a:ln w="38100" cap="flat" cmpd="sng" algn="ctr">
+          <a:solidFill>
+            <a:schemeClr val="phClr"/>
+          </a:solidFill>
+          <a:prstDash val="solid"/>
+        </a:ln>
+      </a:lnStyleLst>
+      <a:effectStyleLst>
+        <a:effectStyle>
+          <a:effectLst>
+            <a:outerShdw blurRad="40000" dist="20000" dir="5400000" rotWithShape="0">
+              <a:srgbClr val="000000">
+                <a:alpha val="38000"/>
+              </a:srgbClr>
+            </a:outerShdw>
+          </a:effectLst>
+        </a:effectStyle>
+        <a:effectStyle>
+          <a:effectLst>
+            <a:outerShdw blurRad="40000" dist="23000" dir="5400000" rotWithShape="0">
+              <a:srgbClr val="000000">
+                <a:alpha val="35000"/>
+              </a:srgbClr>
+            </a:outerShdw>
+          </a:effectLst>
+        </a:effectStyle>
+        <a:effectStyle>
+          <a:effectLst>
+            <a:outerShdw blurRad="40000" dist="23000" dir="5400000" rotWithShape="0">
+              <a:srgbClr val="000000">
+                <a:alpha val="35000"/>
+              </a:srgbClr>
+            </a:outerShdw>
+          </a:effectLst>
+          <a:scene3d>
+            <a:camera prst="orthographicFront">
+              <a:rot lat="0" lon="0" rev="0"/>
+            </a:camera>
+            <a:lightRig rig="threePt" dir="t">
+              <a:rot lat="0" lon="0" rev="1200000"/>
+            </a:lightRig>
+          </a:scene3d>
+          <a:sp3d>
+            <a:bevelT w="63500" h="25400"/>
+          </a:sp3d>
+        </a:effectStyle>
+      </a:effectStyleLst>
+      <a:bgFillStyleLst>
+        <a:solidFill>
+          <a:schemeClr val="phClr"/>
+        </a:solidFill>
+        <a:gradFill rotWithShape="1">
+          <a:gsLst>
+            <a:gs pos="0">
+              <a:schemeClr val="phClr">
+                <a:tint val="40000"/>
+                <a:satMod val="350000"/>
+              </a:schemeClr>
+            </a:gs>
+            <a:gs pos="40000">
+              <a:schemeClr val="phClr">
+                <a:tint val="45000"/>
+                <a:shade val="99000"/>
+                <a:satMod val="350000"/>
+              </a:schemeClr>
+            </a:gs>
+            <a:gs pos="100000">
+              <a:schemeClr val="phClr">
+                <a:shade val="20000"/>
+                <a:satMod val="255000"/>
+              </a:schemeClr>
+            </a:gs>
+          </a:gsLst>
+          <a:path path="circle">
+            <a:fillToRect l="50000" t="-80000" r="50000" b="180000"/>
+          </a:path>
+        </a:gradFill>
+        <a:gradFill rotWithShape="1">
+          <a:gsLst>
+            <a:gs pos="0">
+              <a:schemeClr val="phClr">
+                <a:tint val="80000"/>
+                <a:satMod val="300000"/>
+              </a:schemeClr>
+            </a:gs>
+            <a:gs pos="100000">
+              <a:schemeClr val="phClr">
+                <a:shade val="30000"/>
+                <a:satMod val="200000"/>
+              </a:schemeClr>
+            </a:gs>
+          </a:gsLst>
+          <a:path path="circle">
+            <a:fillToRect l="50000" t="50000" r="50000" b="50000"/>
+          </a:path>
+        </a:gradFill>
+      </a:bgFillStyleLst>
+    </a:fmtScheme>
+  </a:themeElements>
+  <a:objectDefaults/>
+  <a:extraClrSchemeLst/>
+</a:theme>
 </file>
</xml_diff>

<commit_message>
Some headers for presentation
</commit_message>
<xml_diff>
--- a/Whats the intent with activites.pptx
+++ b/Whats the intent with activites.pptx
@@ -5,12 +5,17 @@
     <p:sldMasterId id="2147483672" r:id="rId1"/>
   </p:sldMasterIdLst>
   <p:notesMasterIdLst>
-    <p:notesMasterId r:id="rId5"/>
+    <p:notesMasterId r:id="rId10"/>
   </p:notesMasterIdLst>
   <p:sldIdLst>
     <p:sldId id="256" r:id="rId2"/>
     <p:sldId id="257" r:id="rId3"/>
-    <p:sldId id="258" r:id="rId4"/>
+    <p:sldId id="259" r:id="rId4"/>
+    <p:sldId id="260" r:id="rId5"/>
+    <p:sldId id="261" r:id="rId6"/>
+    <p:sldId id="262" r:id="rId7"/>
+    <p:sldId id="263" r:id="rId8"/>
+    <p:sldId id="258" r:id="rId9"/>
   </p:sldIdLst>
   <p:sldSz cx="9144000" cy="6858000" type="screen4x3"/>
   <p:notesSz cx="6858000" cy="9144000"/>
@@ -576,6 +581,96 @@
     <p:extLst>
       <p:ext uri="{BB962C8B-B14F-4D97-AF65-F5344CB8AC3E}">
         <p14:creationId xmlns:p14="http://schemas.microsoft.com/office/powerpoint/2010/main" val="533877379"/>
+      </p:ext>
+    </p:extLst>
+  </p:cSld>
+  <p:clrMapOvr>
+    <a:masterClrMapping/>
+  </p:clrMapOvr>
+</p:notes>
+</file>
+
+<file path=ppt/notesSlides/notesSlide2.xml><?xml version="1.0" encoding="utf-8"?>
+<p:notes xmlns:a="http://schemas.openxmlformats.org/drawingml/2006/main" xmlns:r="http://schemas.openxmlformats.org/officeDocument/2006/relationships" xmlns:p="http://schemas.openxmlformats.org/presentationml/2006/main">
+  <p:cSld>
+    <p:spTree>
+      <p:nvGrpSpPr>
+        <p:cNvPr id="1" name=""/>
+        <p:cNvGrpSpPr/>
+        <p:nvPr/>
+      </p:nvGrpSpPr>
+      <p:grpSpPr>
+        <a:xfrm>
+          <a:off x="0" y="0"/>
+          <a:ext cx="0" cy="0"/>
+          <a:chOff x="0" y="0"/>
+          <a:chExt cx="0" cy="0"/>
+        </a:xfrm>
+      </p:grpSpPr>
+      <p:sp>
+        <p:nvSpPr>
+          <p:cNvPr id="2" name="Slide Image Placeholder 1"/>
+          <p:cNvSpPr>
+            <a:spLocks noGrp="1" noRot="1" noChangeAspect="1"/>
+          </p:cNvSpPr>
+          <p:nvPr>
+            <p:ph type="sldImg"/>
+          </p:nvPr>
+        </p:nvSpPr>
+        <p:spPr/>
+      </p:sp>
+      <p:sp>
+        <p:nvSpPr>
+          <p:cNvPr id="3" name="Notes Placeholder 2"/>
+          <p:cNvSpPr>
+            <a:spLocks noGrp="1"/>
+          </p:cNvSpPr>
+          <p:nvPr>
+            <p:ph type="body" idx="1"/>
+          </p:nvPr>
+        </p:nvSpPr>
+        <p:spPr/>
+        <p:txBody>
+          <a:bodyPr/>
+          <a:lstStyle/>
+          <a:p>
+            <a:r>
+              <a:rPr lang="sv-SE" dirty="0" smtClean="0">
+                <a:hlinkClick r:id="rId3"/>
+              </a:rPr>
+              <a:t>http://code.google.com/p/zxing/</a:t>
+            </a:r>
+            <a:endParaRPr lang="sv-SE" dirty="0"/>
+          </a:p>
+        </p:txBody>
+      </p:sp>
+      <p:sp>
+        <p:nvSpPr>
+          <p:cNvPr id="4" name="Slide Number Placeholder 3"/>
+          <p:cNvSpPr>
+            <a:spLocks noGrp="1"/>
+          </p:cNvSpPr>
+          <p:nvPr>
+            <p:ph type="sldNum" sz="quarter" idx="10"/>
+          </p:nvPr>
+        </p:nvSpPr>
+        <p:spPr/>
+        <p:txBody>
+          <a:bodyPr/>
+          <a:lstStyle/>
+          <a:p>
+            <a:fld id="{4AC1C784-466F-4ABA-A6E5-D6D202D28610}" type="slidenum">
+              <a:rPr lang="sv-SE" smtClean="0"/>
+              <a:t>7</a:t>
+            </a:fld>
+            <a:endParaRPr lang="sv-SE"/>
+          </a:p>
+        </p:txBody>
+      </p:sp>
+    </p:spTree>
+    <p:extLst>
+      <p:ext uri="{BB962C8B-B14F-4D97-AF65-F5344CB8AC3E}">
+        <p14:creationId xmlns:p14="http://schemas.microsoft.com/office/powerpoint/2010/main" val="617657722"/>
       </p:ext>
     </p:extLst>
   </p:cSld>
@@ -3199,6 +3294,371 @@
 </file>
 
 <file path=ppt/slides/slide3.xml><?xml version="1.0" encoding="utf-8"?>
+<p:sld xmlns:a="http://schemas.openxmlformats.org/drawingml/2006/main" xmlns:r="http://schemas.openxmlformats.org/officeDocument/2006/relationships" xmlns:p="http://schemas.openxmlformats.org/presentationml/2006/main">
+  <p:cSld>
+    <p:spTree>
+      <p:nvGrpSpPr>
+        <p:cNvPr id="1" name=""/>
+        <p:cNvGrpSpPr/>
+        <p:nvPr/>
+      </p:nvGrpSpPr>
+      <p:grpSpPr>
+        <a:xfrm>
+          <a:off x="0" y="0"/>
+          <a:ext cx="0" cy="0"/>
+          <a:chOff x="0" y="0"/>
+          <a:chExt cx="0" cy="0"/>
+        </a:xfrm>
+      </p:grpSpPr>
+      <p:sp>
+        <p:nvSpPr>
+          <p:cNvPr id="2" name="Title 1"/>
+          <p:cNvSpPr>
+            <a:spLocks noGrp="1"/>
+          </p:cNvSpPr>
+          <p:nvPr>
+            <p:ph type="title"/>
+          </p:nvPr>
+        </p:nvSpPr>
+        <p:spPr/>
+        <p:txBody>
+          <a:bodyPr/>
+          <a:lstStyle/>
+          <a:p>
+            <a:r>
+              <a:rPr lang="sv-SE" dirty="0" smtClean="0"/>
+              <a:t>Activites</a:t>
+            </a:r>
+            <a:endParaRPr lang="sv-SE" dirty="0"/>
+          </a:p>
+        </p:txBody>
+      </p:sp>
+      <p:sp>
+        <p:nvSpPr>
+          <p:cNvPr id="3" name="Content Placeholder 2"/>
+          <p:cNvSpPr>
+            <a:spLocks noGrp="1"/>
+          </p:cNvSpPr>
+          <p:nvPr>
+            <p:ph idx="1"/>
+          </p:nvPr>
+        </p:nvSpPr>
+        <p:spPr/>
+        <p:txBody>
+          <a:bodyPr/>
+          <a:lstStyle/>
+          <a:p>
+            <a:endParaRPr lang="sv-SE"/>
+          </a:p>
+        </p:txBody>
+      </p:sp>
+    </p:spTree>
+    <p:extLst>
+      <p:ext uri="{BB962C8B-B14F-4D97-AF65-F5344CB8AC3E}">
+        <p14:creationId xmlns:p14="http://schemas.microsoft.com/office/powerpoint/2010/main" val="3303589605"/>
+      </p:ext>
+    </p:extLst>
+  </p:cSld>
+  <p:clrMapOvr>
+    <a:masterClrMapping/>
+  </p:clrMapOvr>
+  <p:transition/>
+</p:sld>
+</file>
+
+<file path=ppt/slides/slide4.xml><?xml version="1.0" encoding="utf-8"?>
+<p:sld xmlns:a="http://schemas.openxmlformats.org/drawingml/2006/main" xmlns:r="http://schemas.openxmlformats.org/officeDocument/2006/relationships" xmlns:p="http://schemas.openxmlformats.org/presentationml/2006/main">
+  <p:cSld>
+    <p:spTree>
+      <p:nvGrpSpPr>
+        <p:cNvPr id="1" name=""/>
+        <p:cNvGrpSpPr/>
+        <p:nvPr/>
+      </p:nvGrpSpPr>
+      <p:grpSpPr>
+        <a:xfrm>
+          <a:off x="0" y="0"/>
+          <a:ext cx="0" cy="0"/>
+          <a:chOff x="0" y="0"/>
+          <a:chExt cx="0" cy="0"/>
+        </a:xfrm>
+      </p:grpSpPr>
+      <p:sp>
+        <p:nvSpPr>
+          <p:cNvPr id="2" name="Title 1"/>
+          <p:cNvSpPr>
+            <a:spLocks noGrp="1"/>
+          </p:cNvSpPr>
+          <p:nvPr>
+            <p:ph type="title"/>
+          </p:nvPr>
+        </p:nvSpPr>
+        <p:spPr/>
+        <p:txBody>
+          <a:bodyPr/>
+          <a:lstStyle/>
+          <a:p>
+            <a:r>
+              <a:rPr lang="sv-SE" dirty="0" smtClean="0"/>
+              <a:t>Application lifecycle</a:t>
+            </a:r>
+            <a:endParaRPr lang="sv-SE" dirty="0"/>
+          </a:p>
+        </p:txBody>
+      </p:sp>
+      <p:sp>
+        <p:nvSpPr>
+          <p:cNvPr id="3" name="Content Placeholder 2"/>
+          <p:cNvSpPr>
+            <a:spLocks noGrp="1"/>
+          </p:cNvSpPr>
+          <p:nvPr>
+            <p:ph idx="1"/>
+          </p:nvPr>
+        </p:nvSpPr>
+        <p:spPr/>
+        <p:txBody>
+          <a:bodyPr/>
+          <a:lstStyle/>
+          <a:p>
+            <a:endParaRPr lang="sv-SE"/>
+          </a:p>
+        </p:txBody>
+      </p:sp>
+    </p:spTree>
+    <p:extLst>
+      <p:ext uri="{BB962C8B-B14F-4D97-AF65-F5344CB8AC3E}">
+        <p14:creationId xmlns:p14="http://schemas.microsoft.com/office/powerpoint/2010/main" val="1680298442"/>
+      </p:ext>
+    </p:extLst>
+  </p:cSld>
+  <p:clrMapOvr>
+    <a:masterClrMapping/>
+  </p:clrMapOvr>
+  <p:transition/>
+</p:sld>
+</file>
+
+<file path=ppt/slides/slide5.xml><?xml version="1.0" encoding="utf-8"?>
+<p:sld xmlns:a="http://schemas.openxmlformats.org/drawingml/2006/main" xmlns:r="http://schemas.openxmlformats.org/officeDocument/2006/relationships" xmlns:p="http://schemas.openxmlformats.org/presentationml/2006/main">
+  <p:cSld>
+    <p:spTree>
+      <p:nvGrpSpPr>
+        <p:cNvPr id="1" name=""/>
+        <p:cNvGrpSpPr/>
+        <p:nvPr/>
+      </p:nvGrpSpPr>
+      <p:grpSpPr>
+        <a:xfrm>
+          <a:off x="0" y="0"/>
+          <a:ext cx="0" cy="0"/>
+          <a:chOff x="0" y="0"/>
+          <a:chExt cx="0" cy="0"/>
+        </a:xfrm>
+      </p:grpSpPr>
+      <p:sp>
+        <p:nvSpPr>
+          <p:cNvPr id="2" name="Title 1"/>
+          <p:cNvSpPr>
+            <a:spLocks noGrp="1"/>
+          </p:cNvSpPr>
+          <p:nvPr>
+            <p:ph type="title"/>
+          </p:nvPr>
+        </p:nvSpPr>
+        <p:spPr/>
+        <p:txBody>
+          <a:bodyPr/>
+          <a:lstStyle/>
+          <a:p>
+            <a:r>
+              <a:rPr lang="sv-SE" dirty="0" smtClean="0"/>
+              <a:t>Intents</a:t>
+            </a:r>
+            <a:endParaRPr lang="sv-SE" dirty="0"/>
+          </a:p>
+        </p:txBody>
+      </p:sp>
+      <p:sp>
+        <p:nvSpPr>
+          <p:cNvPr id="3" name="Content Placeholder 2"/>
+          <p:cNvSpPr>
+            <a:spLocks noGrp="1"/>
+          </p:cNvSpPr>
+          <p:nvPr>
+            <p:ph idx="1"/>
+          </p:nvPr>
+        </p:nvSpPr>
+        <p:spPr/>
+        <p:txBody>
+          <a:bodyPr/>
+          <a:lstStyle/>
+          <a:p>
+            <a:endParaRPr lang="sv-SE"/>
+          </a:p>
+        </p:txBody>
+      </p:sp>
+    </p:spTree>
+    <p:extLst>
+      <p:ext uri="{BB962C8B-B14F-4D97-AF65-F5344CB8AC3E}">
+        <p14:creationId xmlns:p14="http://schemas.microsoft.com/office/powerpoint/2010/main" val="637129972"/>
+      </p:ext>
+    </p:extLst>
+  </p:cSld>
+  <p:clrMapOvr>
+    <a:masterClrMapping/>
+  </p:clrMapOvr>
+  <p:transition/>
+</p:sld>
+</file>
+
+<file path=ppt/slides/slide6.xml><?xml version="1.0" encoding="utf-8"?>
+<p:sld xmlns:a="http://schemas.openxmlformats.org/drawingml/2006/main" xmlns:r="http://schemas.openxmlformats.org/officeDocument/2006/relationships" xmlns:p="http://schemas.openxmlformats.org/presentationml/2006/main">
+  <p:cSld>
+    <p:spTree>
+      <p:nvGrpSpPr>
+        <p:cNvPr id="1" name=""/>
+        <p:cNvGrpSpPr/>
+        <p:nvPr/>
+      </p:nvGrpSpPr>
+      <p:grpSpPr>
+        <a:xfrm>
+          <a:off x="0" y="0"/>
+          <a:ext cx="0" cy="0"/>
+          <a:chOff x="0" y="0"/>
+          <a:chExt cx="0" cy="0"/>
+        </a:xfrm>
+      </p:grpSpPr>
+      <p:sp>
+        <p:nvSpPr>
+          <p:cNvPr id="2" name="Title 1"/>
+          <p:cNvSpPr>
+            <a:spLocks noGrp="1"/>
+          </p:cNvSpPr>
+          <p:nvPr>
+            <p:ph type="title"/>
+          </p:nvPr>
+        </p:nvSpPr>
+        <p:spPr/>
+        <p:txBody>
+          <a:bodyPr/>
+          <a:lstStyle/>
+          <a:p>
+            <a:r>
+              <a:rPr lang="sv-SE" dirty="0" smtClean="0"/>
+              <a:t>Taking a Picture</a:t>
+            </a:r>
+            <a:endParaRPr lang="sv-SE" dirty="0"/>
+          </a:p>
+        </p:txBody>
+      </p:sp>
+      <p:sp>
+        <p:nvSpPr>
+          <p:cNvPr id="3" name="Content Placeholder 2"/>
+          <p:cNvSpPr>
+            <a:spLocks noGrp="1"/>
+          </p:cNvSpPr>
+          <p:nvPr>
+            <p:ph idx="1"/>
+          </p:nvPr>
+        </p:nvSpPr>
+        <p:spPr/>
+        <p:txBody>
+          <a:bodyPr/>
+          <a:lstStyle/>
+          <a:p>
+            <a:endParaRPr lang="sv-SE" dirty="0"/>
+          </a:p>
+        </p:txBody>
+      </p:sp>
+    </p:spTree>
+    <p:extLst>
+      <p:ext uri="{BB962C8B-B14F-4D97-AF65-F5344CB8AC3E}">
+        <p14:creationId xmlns:p14="http://schemas.microsoft.com/office/powerpoint/2010/main" val="3754670192"/>
+      </p:ext>
+    </p:extLst>
+  </p:cSld>
+  <p:clrMapOvr>
+    <a:masterClrMapping/>
+  </p:clrMapOvr>
+  <p:transition/>
+</p:sld>
+</file>
+
+<file path=ppt/slides/slide7.xml><?xml version="1.0" encoding="utf-8"?>
+<p:sld xmlns:a="http://schemas.openxmlformats.org/drawingml/2006/main" xmlns:r="http://schemas.openxmlformats.org/officeDocument/2006/relationships" xmlns:p="http://schemas.openxmlformats.org/presentationml/2006/main">
+  <p:cSld>
+    <p:spTree>
+      <p:nvGrpSpPr>
+        <p:cNvPr id="1" name=""/>
+        <p:cNvGrpSpPr/>
+        <p:nvPr/>
+      </p:nvGrpSpPr>
+      <p:grpSpPr>
+        <a:xfrm>
+          <a:off x="0" y="0"/>
+          <a:ext cx="0" cy="0"/>
+          <a:chOff x="0" y="0"/>
+          <a:chExt cx="0" cy="0"/>
+        </a:xfrm>
+      </p:grpSpPr>
+      <p:sp>
+        <p:nvSpPr>
+          <p:cNvPr id="2" name="Title 1"/>
+          <p:cNvSpPr>
+            <a:spLocks noGrp="1"/>
+          </p:cNvSpPr>
+          <p:nvPr>
+            <p:ph type="title"/>
+          </p:nvPr>
+        </p:nvSpPr>
+        <p:spPr/>
+        <p:txBody>
+          <a:bodyPr/>
+          <a:lstStyle/>
+          <a:p>
+            <a:r>
+              <a:rPr lang="sv-SE" dirty="0" smtClean="0"/>
+              <a:t>Barcode Scanner</a:t>
+            </a:r>
+            <a:endParaRPr lang="sv-SE" dirty="0"/>
+          </a:p>
+        </p:txBody>
+      </p:sp>
+      <p:sp>
+        <p:nvSpPr>
+          <p:cNvPr id="3" name="Content Placeholder 2"/>
+          <p:cNvSpPr>
+            <a:spLocks noGrp="1"/>
+          </p:cNvSpPr>
+          <p:nvPr>
+            <p:ph idx="1"/>
+          </p:nvPr>
+        </p:nvSpPr>
+        <p:spPr/>
+        <p:txBody>
+          <a:bodyPr/>
+          <a:lstStyle/>
+          <a:p>
+            <a:endParaRPr lang="sv-SE"/>
+          </a:p>
+        </p:txBody>
+      </p:sp>
+    </p:spTree>
+    <p:extLst>
+      <p:ext uri="{BB962C8B-B14F-4D97-AF65-F5344CB8AC3E}">
+        <p14:creationId xmlns:p14="http://schemas.microsoft.com/office/powerpoint/2010/main" val="2163674846"/>
+      </p:ext>
+    </p:extLst>
+  </p:cSld>
+  <p:clrMapOvr>
+    <a:masterClrMapping/>
+  </p:clrMapOvr>
+  <p:transition/>
+</p:sld>
+</file>
+
+<file path=ppt/slides/slide8.xml><?xml version="1.0" encoding="utf-8"?>
 <p:sld xmlns:a="http://schemas.openxmlformats.org/drawingml/2006/main" xmlns:r="http://schemas.openxmlformats.org/officeDocument/2006/relationships" xmlns:p="http://schemas.openxmlformats.org/presentationml/2006/main">
   <p:cSld>
     <p:spTree>

</xml_diff>

<commit_message>
Presentation more or less complete
</commit_message>
<xml_diff>
--- a/Whats the intent with activites.pptx
+++ b/Whats the intent with activites.pptx
@@ -5,7 +5,7 @@
     <p:sldMasterId id="2147483672" r:id="rId1"/>
   </p:sldMasterIdLst>
   <p:notesMasterIdLst>
-    <p:notesMasterId r:id="rId10"/>
+    <p:notesMasterId r:id="rId11"/>
   </p:notesMasterIdLst>
   <p:sldIdLst>
     <p:sldId id="256" r:id="rId2"/>
@@ -14,8 +14,9 @@
     <p:sldId id="260" r:id="rId5"/>
     <p:sldId id="261" r:id="rId6"/>
     <p:sldId id="262" r:id="rId7"/>
-    <p:sldId id="263" r:id="rId8"/>
-    <p:sldId id="258" r:id="rId9"/>
+    <p:sldId id="264" r:id="rId8"/>
+    <p:sldId id="263" r:id="rId9"/>
+    <p:sldId id="258" r:id="rId10"/>
   </p:sldIdLst>
   <p:sldSz cx="9144000" cy="6858000" type="screen4x3"/>
   <p:notesSz cx="6858000" cy="9144000"/>
@@ -238,7 +239,7 @@
           <a:p>
             <a:fld id="{FA6D979C-6CDC-4C22-9F0D-CDB89CF792FD}" type="datetimeFigureOut">
               <a:rPr lang="sv-SE" smtClean="0"/>
-              <a:t>2011-09-18</a:t>
+              <a:t>2011-09-28</a:t>
             </a:fld>
             <a:endParaRPr lang="sv-SE"/>
           </a:p>
@@ -552,13 +553,24 @@
           <a:p>
             <a:r>
               <a:rPr lang="sv-SE" dirty="0" smtClean="0"/>
-              <a:t>’Open Source’</a:t>
-            </a:r>
+              <a:t>’Open Source’ (AOSP,</a:t>
+            </a:r>
+            <a:r>
+              <a:rPr lang="sv-SE" baseline="0" dirty="0" smtClean="0"/>
+              <a:t> Android Open Source Project)</a:t>
+            </a:r>
+            <a:endParaRPr lang="sv-SE" dirty="0" smtClean="0"/>
           </a:p>
           <a:p>
             <a:r>
               <a:rPr lang="sv-SE" dirty="0" smtClean="0"/>
-              <a:t>Java and/or</a:t>
+              <a:t>Linux</a:t>
+            </a:r>
+          </a:p>
+          <a:p>
+            <a:r>
+              <a:rPr lang="sv-SE" dirty="0" smtClean="0"/>
+              <a:t>Java dalvik vm and/or</a:t>
             </a:r>
             <a:r>
               <a:rPr lang="sv-SE" baseline="0" dirty="0" smtClean="0"/>
@@ -566,6 +578,20 @@
             </a:r>
           </a:p>
           <a:p>
+            <a:r>
+              <a:rPr lang="sv-SE" dirty="0" smtClean="0"/>
+              <a:t>Ow</a:t>
+            </a:r>
+            <a:r>
+              <a:rPr lang="sv-SE" baseline="0" dirty="0" smtClean="0"/>
+              <a:t>n UI toolkit, shares some parts of the framwork api with suns jre</a:t>
+            </a:r>
+          </a:p>
+          <a:p>
+            <a:r>
+              <a:rPr lang="sv-SE" baseline="0" dirty="0" smtClean="0"/>
+              <a:t>SDK Free (Win, Mac, Linux), device debugging free, Market account $25</a:t>
+            </a:r>
             <a:endParaRPr lang="sv-SE" dirty="0"/>
           </a:p>
         </p:txBody>
@@ -651,10 +677,466 @@
           <a:lstStyle/>
           <a:p>
             <a:r>
+              <a:rPr lang="sv-SE" dirty="0" smtClean="0"/>
+              <a:t>Presentation layer,</a:t>
+            </a:r>
+            <a:r>
+              <a:rPr lang="sv-SE" baseline="0" dirty="0" smtClean="0"/>
+              <a:t> uses a view to define a layout</a:t>
+            </a:r>
+          </a:p>
+          <a:p>
+            <a:r>
+              <a:rPr lang="sv-SE" baseline="0" dirty="0" smtClean="0"/>
+              <a:t>Layout defined in xml (htmlish) or from code</a:t>
+            </a:r>
+          </a:p>
+          <a:p>
+            <a:r>
+              <a:rPr lang="sv-SE" dirty="0" smtClean="0"/>
+              <a:t>Navigate between activites</a:t>
+            </a:r>
+            <a:r>
+              <a:rPr lang="sv-SE" baseline="0" dirty="0" smtClean="0"/>
+              <a:t> by starting them and returning from them (stack)</a:t>
+            </a:r>
+          </a:p>
+          <a:p>
+            <a:endParaRPr lang="sv-SE" baseline="0" dirty="0" smtClean="0"/>
+          </a:p>
+          <a:p>
+            <a:endParaRPr lang="sv-SE" baseline="0" dirty="0" smtClean="0"/>
+          </a:p>
+          <a:p>
+            <a:r>
+              <a:rPr lang="sv-SE" smtClean="0">
+                <a:hlinkClick r:id="rId3"/>
+              </a:rPr>
+              <a:t>http://www.flickr.com/photos/stuckincustoms/3946279121/sizes/l/in/photostream/</a:t>
+            </a:r>
+            <a:endParaRPr lang="sv-SE" baseline="0" dirty="0" smtClean="0"/>
+          </a:p>
+          <a:p>
+            <a:endParaRPr lang="sv-SE" dirty="0"/>
+          </a:p>
+        </p:txBody>
+      </p:sp>
+      <p:sp>
+        <p:nvSpPr>
+          <p:cNvPr id="4" name="Slide Number Placeholder 3"/>
+          <p:cNvSpPr>
+            <a:spLocks noGrp="1"/>
+          </p:cNvSpPr>
+          <p:nvPr>
+            <p:ph type="sldNum" sz="quarter" idx="10"/>
+          </p:nvPr>
+        </p:nvSpPr>
+        <p:spPr/>
+        <p:txBody>
+          <a:bodyPr/>
+          <a:lstStyle/>
+          <a:p>
+            <a:fld id="{4AC1C784-466F-4ABA-A6E5-D6D202D28610}" type="slidenum">
+              <a:rPr lang="sv-SE" smtClean="0"/>
+              <a:t>3</a:t>
+            </a:fld>
+            <a:endParaRPr lang="sv-SE"/>
+          </a:p>
+        </p:txBody>
+      </p:sp>
+    </p:spTree>
+    <p:extLst>
+      <p:ext uri="{BB962C8B-B14F-4D97-AF65-F5344CB8AC3E}">
+        <p14:creationId xmlns:p14="http://schemas.microsoft.com/office/powerpoint/2010/main" val="1005879205"/>
+      </p:ext>
+    </p:extLst>
+  </p:cSld>
+  <p:clrMapOvr>
+    <a:masterClrMapping/>
+  </p:clrMapOvr>
+</p:notes>
+</file>
+
+<file path=ppt/notesSlides/notesSlide3.xml><?xml version="1.0" encoding="utf-8"?>
+<p:notes xmlns:a="http://schemas.openxmlformats.org/drawingml/2006/main" xmlns:r="http://schemas.openxmlformats.org/officeDocument/2006/relationships" xmlns:p="http://schemas.openxmlformats.org/presentationml/2006/main">
+  <p:cSld>
+    <p:spTree>
+      <p:nvGrpSpPr>
+        <p:cNvPr id="1" name=""/>
+        <p:cNvGrpSpPr/>
+        <p:nvPr/>
+      </p:nvGrpSpPr>
+      <p:grpSpPr>
+        <a:xfrm>
+          <a:off x="0" y="0"/>
+          <a:ext cx="0" cy="0"/>
+          <a:chOff x="0" y="0"/>
+          <a:chExt cx="0" cy="0"/>
+        </a:xfrm>
+      </p:grpSpPr>
+      <p:sp>
+        <p:nvSpPr>
+          <p:cNvPr id="2" name="Slide Image Placeholder 1"/>
+          <p:cNvSpPr>
+            <a:spLocks noGrp="1" noRot="1" noChangeAspect="1"/>
+          </p:cNvSpPr>
+          <p:nvPr>
+            <p:ph type="sldImg"/>
+          </p:nvPr>
+        </p:nvSpPr>
+        <p:spPr/>
+      </p:sp>
+      <p:sp>
+        <p:nvSpPr>
+          <p:cNvPr id="3" name="Notes Placeholder 2"/>
+          <p:cNvSpPr>
+            <a:spLocks noGrp="1"/>
+          </p:cNvSpPr>
+          <p:nvPr>
+            <p:ph type="body" idx="1"/>
+          </p:nvPr>
+        </p:nvSpPr>
+        <p:spPr/>
+        <p:txBody>
+          <a:bodyPr/>
+          <a:lstStyle/>
+          <a:p>
+            <a:r>
+              <a:rPr lang="sv-SE" dirty="0" smtClean="0"/>
+              <a:t>Priority: Visible</a:t>
+            </a:r>
+            <a:r>
+              <a:rPr lang="sv-SE" baseline="0" dirty="0" smtClean="0"/>
+              <a:t> (activity)</a:t>
+            </a:r>
+            <a:r>
+              <a:rPr lang="sv-SE" dirty="0" smtClean="0"/>
+              <a:t>, services,</a:t>
+            </a:r>
+            <a:r>
+              <a:rPr lang="sv-SE" baseline="0" dirty="0" smtClean="0"/>
+              <a:t> background (activity w/o service)</a:t>
+            </a:r>
+          </a:p>
+          <a:p>
+            <a:r>
+              <a:rPr lang="sv-SE" baseline="0" dirty="0" smtClean="0"/>
+              <a:t>Possible to save ui state</a:t>
+            </a:r>
+          </a:p>
+          <a:p>
+            <a:endParaRPr lang="sv-SE" dirty="0"/>
+          </a:p>
+        </p:txBody>
+      </p:sp>
+      <p:sp>
+        <p:nvSpPr>
+          <p:cNvPr id="4" name="Slide Number Placeholder 3"/>
+          <p:cNvSpPr>
+            <a:spLocks noGrp="1"/>
+          </p:cNvSpPr>
+          <p:nvPr>
+            <p:ph type="sldNum" sz="quarter" idx="10"/>
+          </p:nvPr>
+        </p:nvSpPr>
+        <p:spPr/>
+        <p:txBody>
+          <a:bodyPr/>
+          <a:lstStyle/>
+          <a:p>
+            <a:fld id="{4AC1C784-466F-4ABA-A6E5-D6D202D28610}" type="slidenum">
+              <a:rPr lang="sv-SE" smtClean="0"/>
+              <a:t>4</a:t>
+            </a:fld>
+            <a:endParaRPr lang="sv-SE"/>
+          </a:p>
+        </p:txBody>
+      </p:sp>
+    </p:spTree>
+    <p:extLst>
+      <p:ext uri="{BB962C8B-B14F-4D97-AF65-F5344CB8AC3E}">
+        <p14:creationId xmlns:p14="http://schemas.microsoft.com/office/powerpoint/2010/main" val="1377816956"/>
+      </p:ext>
+    </p:extLst>
+  </p:cSld>
+  <p:clrMapOvr>
+    <a:masterClrMapping/>
+  </p:clrMapOvr>
+</p:notes>
+</file>
+
+<file path=ppt/notesSlides/notesSlide4.xml><?xml version="1.0" encoding="utf-8"?>
+<p:notes xmlns:a="http://schemas.openxmlformats.org/drawingml/2006/main" xmlns:r="http://schemas.openxmlformats.org/officeDocument/2006/relationships" xmlns:p="http://schemas.openxmlformats.org/presentationml/2006/main">
+  <p:cSld>
+    <p:spTree>
+      <p:nvGrpSpPr>
+        <p:cNvPr id="1" name=""/>
+        <p:cNvGrpSpPr/>
+        <p:nvPr/>
+      </p:nvGrpSpPr>
+      <p:grpSpPr>
+        <a:xfrm>
+          <a:off x="0" y="0"/>
+          <a:ext cx="0" cy="0"/>
+          <a:chOff x="0" y="0"/>
+          <a:chExt cx="0" cy="0"/>
+        </a:xfrm>
+      </p:grpSpPr>
+      <p:sp>
+        <p:nvSpPr>
+          <p:cNvPr id="2" name="Slide Image Placeholder 1"/>
+          <p:cNvSpPr>
+            <a:spLocks noGrp="1" noRot="1" noChangeAspect="1"/>
+          </p:cNvSpPr>
+          <p:nvPr>
+            <p:ph type="sldImg"/>
+          </p:nvPr>
+        </p:nvSpPr>
+        <p:spPr/>
+      </p:sp>
+      <p:sp>
+        <p:nvSpPr>
+          <p:cNvPr id="3" name="Notes Placeholder 2"/>
+          <p:cNvSpPr>
+            <a:spLocks noGrp="1"/>
+          </p:cNvSpPr>
+          <p:nvPr>
+            <p:ph type="body" idx="1"/>
+          </p:nvPr>
+        </p:nvSpPr>
+        <p:spPr/>
+        <p:txBody>
+          <a:bodyPr/>
+          <a:lstStyle/>
+          <a:p>
+            <a:r>
+              <a:rPr lang="sv-SE" dirty="0" smtClean="0"/>
+              <a:t>Message passing within</a:t>
+            </a:r>
+            <a:r>
+              <a:rPr lang="sv-SE" baseline="0" dirty="0" smtClean="0"/>
+              <a:t> &amp; between applications</a:t>
+            </a:r>
+          </a:p>
+          <a:p>
+            <a:r>
+              <a:rPr lang="sv-SE" dirty="0" smtClean="0"/>
+              <a:t>Start activity/</a:t>
+            </a:r>
+            <a:r>
+              <a:rPr lang="sv-SE" baseline="0" dirty="0" smtClean="0"/>
+              <a:t>service to perform and action or broadcast event or start a activity/server</a:t>
+            </a:r>
+          </a:p>
+          <a:p>
+            <a:r>
+              <a:rPr lang="sv-SE" baseline="0" dirty="0" smtClean="0"/>
+              <a:t>Startactivity / startactivityforresult</a:t>
+            </a:r>
+          </a:p>
+          <a:p>
+            <a:r>
+              <a:rPr lang="sv-SE" baseline="0" dirty="0" smtClean="0"/>
+              <a:t>Onactivityresult </a:t>
+            </a:r>
+            <a:r>
+              <a:rPr lang="sv-SE" baseline="0" dirty="0" smtClean="0"/>
+              <a:t>callback</a:t>
+            </a:r>
+          </a:p>
+          <a:p>
+            <a:endParaRPr lang="sv-SE" baseline="0" dirty="0" smtClean="0"/>
+          </a:p>
+          <a:p>
+            <a:r>
               <a:rPr lang="sv-SE" dirty="0" smtClean="0">
                 <a:hlinkClick r:id="rId3"/>
               </a:rPr>
-              <a:t>http://code.google.com/p/zxing/</a:t>
+              <a:t>http://www.flickr.com/photos/craftydame/4383720879/sizes/l/in/photostream/</a:t>
+            </a:r>
+            <a:endParaRPr lang="sv-SE" dirty="0"/>
+          </a:p>
+        </p:txBody>
+      </p:sp>
+      <p:sp>
+        <p:nvSpPr>
+          <p:cNvPr id="4" name="Slide Number Placeholder 3"/>
+          <p:cNvSpPr>
+            <a:spLocks noGrp="1"/>
+          </p:cNvSpPr>
+          <p:nvPr>
+            <p:ph type="sldNum" sz="quarter" idx="10"/>
+          </p:nvPr>
+        </p:nvSpPr>
+        <p:spPr/>
+        <p:txBody>
+          <a:bodyPr/>
+          <a:lstStyle/>
+          <a:p>
+            <a:fld id="{4AC1C784-466F-4ABA-A6E5-D6D202D28610}" type="slidenum">
+              <a:rPr lang="sv-SE" smtClean="0"/>
+              <a:t>5</a:t>
+            </a:fld>
+            <a:endParaRPr lang="sv-SE"/>
+          </a:p>
+        </p:txBody>
+      </p:sp>
+    </p:spTree>
+    <p:extLst>
+      <p:ext uri="{BB962C8B-B14F-4D97-AF65-F5344CB8AC3E}">
+        <p14:creationId xmlns:p14="http://schemas.microsoft.com/office/powerpoint/2010/main" val="2480209086"/>
+      </p:ext>
+    </p:extLst>
+  </p:cSld>
+  <p:clrMapOvr>
+    <a:masterClrMapping/>
+  </p:clrMapOvr>
+</p:notes>
+</file>
+
+<file path=ppt/notesSlides/notesSlide5.xml><?xml version="1.0" encoding="utf-8"?>
+<p:notes xmlns:a="http://schemas.openxmlformats.org/drawingml/2006/main" xmlns:r="http://schemas.openxmlformats.org/officeDocument/2006/relationships" xmlns:p="http://schemas.openxmlformats.org/presentationml/2006/main">
+  <p:cSld>
+    <p:spTree>
+      <p:nvGrpSpPr>
+        <p:cNvPr id="1" name=""/>
+        <p:cNvGrpSpPr/>
+        <p:nvPr/>
+      </p:nvGrpSpPr>
+      <p:grpSpPr>
+        <a:xfrm>
+          <a:off x="0" y="0"/>
+          <a:ext cx="0" cy="0"/>
+          <a:chOff x="0" y="0"/>
+          <a:chExt cx="0" cy="0"/>
+        </a:xfrm>
+      </p:grpSpPr>
+      <p:sp>
+        <p:nvSpPr>
+          <p:cNvPr id="2" name="Slide Image Placeholder 1"/>
+          <p:cNvSpPr>
+            <a:spLocks noGrp="1" noRot="1" noChangeAspect="1"/>
+          </p:cNvSpPr>
+          <p:nvPr>
+            <p:ph type="sldImg"/>
+          </p:nvPr>
+        </p:nvSpPr>
+        <p:spPr/>
+      </p:sp>
+      <p:sp>
+        <p:nvSpPr>
+          <p:cNvPr id="3" name="Notes Placeholder 2"/>
+          <p:cNvSpPr>
+            <a:spLocks noGrp="1"/>
+          </p:cNvSpPr>
+          <p:nvPr>
+            <p:ph type="body" idx="1"/>
+          </p:nvPr>
+        </p:nvSpPr>
+        <p:spPr/>
+        <p:txBody>
+          <a:bodyPr/>
+          <a:lstStyle/>
+          <a:p>
+            <a:r>
+              <a:rPr lang="sv-SE" dirty="0" smtClean="0"/>
+              <a:t>From MainActivity</a:t>
+            </a:r>
+            <a:r>
+              <a:rPr lang="sv-SE" baseline="0" dirty="0" smtClean="0"/>
+              <a:t> start the activity FooActivity</a:t>
+            </a:r>
+            <a:endParaRPr lang="sv-SE" dirty="0"/>
+          </a:p>
+        </p:txBody>
+      </p:sp>
+      <p:sp>
+        <p:nvSpPr>
+          <p:cNvPr id="4" name="Slide Number Placeholder 3"/>
+          <p:cNvSpPr>
+            <a:spLocks noGrp="1"/>
+          </p:cNvSpPr>
+          <p:nvPr>
+            <p:ph type="sldNum" sz="quarter" idx="10"/>
+          </p:nvPr>
+        </p:nvSpPr>
+        <p:spPr/>
+        <p:txBody>
+          <a:bodyPr/>
+          <a:lstStyle/>
+          <a:p>
+            <a:fld id="{4AC1C784-466F-4ABA-A6E5-D6D202D28610}" type="slidenum">
+              <a:rPr lang="sv-SE" smtClean="0"/>
+              <a:t>6</a:t>
+            </a:fld>
+            <a:endParaRPr lang="sv-SE"/>
+          </a:p>
+        </p:txBody>
+      </p:sp>
+    </p:spTree>
+    <p:extLst>
+      <p:ext uri="{BB962C8B-B14F-4D97-AF65-F5344CB8AC3E}">
+        <p14:creationId xmlns:p14="http://schemas.microsoft.com/office/powerpoint/2010/main" val="2175716039"/>
+      </p:ext>
+    </p:extLst>
+  </p:cSld>
+  <p:clrMapOvr>
+    <a:masterClrMapping/>
+  </p:clrMapOvr>
+</p:notes>
+</file>
+
+<file path=ppt/notesSlides/notesSlide6.xml><?xml version="1.0" encoding="utf-8"?>
+<p:notes xmlns:a="http://schemas.openxmlformats.org/drawingml/2006/main" xmlns:r="http://schemas.openxmlformats.org/officeDocument/2006/relationships" xmlns:p="http://schemas.openxmlformats.org/presentationml/2006/main">
+  <p:cSld>
+    <p:spTree>
+      <p:nvGrpSpPr>
+        <p:cNvPr id="1" name=""/>
+        <p:cNvGrpSpPr/>
+        <p:nvPr/>
+      </p:nvGrpSpPr>
+      <p:grpSpPr>
+        <a:xfrm>
+          <a:off x="0" y="0"/>
+          <a:ext cx="0" cy="0"/>
+          <a:chOff x="0" y="0"/>
+          <a:chExt cx="0" cy="0"/>
+        </a:xfrm>
+      </p:grpSpPr>
+      <p:sp>
+        <p:nvSpPr>
+          <p:cNvPr id="2" name="Slide Image Placeholder 1"/>
+          <p:cNvSpPr>
+            <a:spLocks noGrp="1" noRot="1" noChangeAspect="1"/>
+          </p:cNvSpPr>
+          <p:nvPr>
+            <p:ph type="sldImg"/>
+          </p:nvPr>
+        </p:nvSpPr>
+        <p:spPr/>
+      </p:sp>
+      <p:sp>
+        <p:nvSpPr>
+          <p:cNvPr id="3" name="Notes Placeholder 2"/>
+          <p:cNvSpPr>
+            <a:spLocks noGrp="1"/>
+          </p:cNvSpPr>
+          <p:nvPr>
+            <p:ph type="body" idx="1"/>
+          </p:nvPr>
+        </p:nvSpPr>
+        <p:spPr/>
+        <p:txBody>
+          <a:bodyPr/>
+          <a:lstStyle/>
+          <a:p>
+            <a:r>
+              <a:rPr lang="sv-SE" dirty="0" smtClean="0"/>
+              <a:t>Starts</a:t>
+            </a:r>
+            <a:r>
+              <a:rPr lang="sv-SE" baseline="0" dirty="0" smtClean="0"/>
+              <a:t> the camera application and should return the uri to a image if one has been captured</a:t>
             </a:r>
             <a:endParaRPr lang="sv-SE" dirty="0"/>
           </a:p>
@@ -686,7 +1168,218 @@
     </p:spTree>
     <p:extLst>
       <p:ext uri="{BB962C8B-B14F-4D97-AF65-F5344CB8AC3E}">
+        <p14:creationId xmlns:p14="http://schemas.microsoft.com/office/powerpoint/2010/main" val="2552831810"/>
+      </p:ext>
+    </p:extLst>
+  </p:cSld>
+  <p:clrMapOvr>
+    <a:masterClrMapping/>
+  </p:clrMapOvr>
+</p:notes>
+</file>
+
+<file path=ppt/notesSlides/notesSlide7.xml><?xml version="1.0" encoding="utf-8"?>
+<p:notes xmlns:a="http://schemas.openxmlformats.org/drawingml/2006/main" xmlns:r="http://schemas.openxmlformats.org/officeDocument/2006/relationships" xmlns:p="http://schemas.openxmlformats.org/presentationml/2006/main">
+  <p:cSld>
+    <p:spTree>
+      <p:nvGrpSpPr>
+        <p:cNvPr id="1" name=""/>
+        <p:cNvGrpSpPr/>
+        <p:nvPr/>
+      </p:nvGrpSpPr>
+      <p:grpSpPr>
+        <a:xfrm>
+          <a:off x="0" y="0"/>
+          <a:ext cx="0" cy="0"/>
+          <a:chOff x="0" y="0"/>
+          <a:chExt cx="0" cy="0"/>
+        </a:xfrm>
+      </p:grpSpPr>
+      <p:sp>
+        <p:nvSpPr>
+          <p:cNvPr id="2" name="Slide Image Placeholder 1"/>
+          <p:cNvSpPr>
+            <a:spLocks noGrp="1" noRot="1" noChangeAspect="1"/>
+          </p:cNvSpPr>
+          <p:nvPr>
+            <p:ph type="sldImg"/>
+          </p:nvPr>
+        </p:nvSpPr>
+        <p:spPr/>
+      </p:sp>
+      <p:sp>
+        <p:nvSpPr>
+          <p:cNvPr id="3" name="Notes Placeholder 2"/>
+          <p:cNvSpPr>
+            <a:spLocks noGrp="1"/>
+          </p:cNvSpPr>
+          <p:nvPr>
+            <p:ph type="body" idx="1"/>
+          </p:nvPr>
+        </p:nvSpPr>
+        <p:spPr/>
+        <p:txBody>
+          <a:bodyPr/>
+          <a:lstStyle/>
+          <a:p>
+            <a:r>
+              <a:rPr lang="sv-SE" dirty="0" smtClean="0">
+                <a:hlinkClick r:id="rId3"/>
+              </a:rPr>
+              <a:t>http</a:t>
+            </a:r>
+            <a:r>
+              <a:rPr lang="sv-SE" dirty="0" smtClean="0">
+                <a:hlinkClick r:id="rId3"/>
+              </a:rPr>
+              <a:t>://code.google.com/p/zxing</a:t>
+            </a:r>
+            <a:r>
+              <a:rPr lang="sv-SE" dirty="0" smtClean="0">
+                <a:hlinkClick r:id="rId3"/>
+              </a:rPr>
+              <a:t>/</a:t>
+            </a:r>
+            <a:r>
+              <a:rPr lang="sv-SE" dirty="0" smtClean="0"/>
+              <a:t> </a:t>
+            </a:r>
+          </a:p>
+          <a:p>
+            <a:r>
+              <a:rPr lang="sv-SE" smtClean="0"/>
+              <a:t>Scans</a:t>
+            </a:r>
+            <a:r>
+              <a:rPr lang="sv-SE" baseline="0" smtClean="0"/>
+              <a:t> QR codes, regular barcodes etc</a:t>
+            </a:r>
+            <a:endParaRPr lang="sv-SE" dirty="0" smtClean="0"/>
+          </a:p>
+          <a:p>
+            <a:r>
+              <a:rPr lang="sv-SE" dirty="0" smtClean="0"/>
+              <a:t>Returns a scanned barcode</a:t>
+            </a:r>
+            <a:endParaRPr lang="sv-SE" dirty="0"/>
+          </a:p>
+        </p:txBody>
+      </p:sp>
+      <p:sp>
+        <p:nvSpPr>
+          <p:cNvPr id="4" name="Slide Number Placeholder 3"/>
+          <p:cNvSpPr>
+            <a:spLocks noGrp="1"/>
+          </p:cNvSpPr>
+          <p:nvPr>
+            <p:ph type="sldNum" sz="quarter" idx="10"/>
+          </p:nvPr>
+        </p:nvSpPr>
+        <p:spPr/>
+        <p:txBody>
+          <a:bodyPr/>
+          <a:lstStyle/>
+          <a:p>
+            <a:fld id="{4AC1C784-466F-4ABA-A6E5-D6D202D28610}" type="slidenum">
+              <a:rPr lang="sv-SE" smtClean="0"/>
+              <a:t>8</a:t>
+            </a:fld>
+            <a:endParaRPr lang="sv-SE"/>
+          </a:p>
+        </p:txBody>
+      </p:sp>
+    </p:spTree>
+    <p:extLst>
+      <p:ext uri="{BB962C8B-B14F-4D97-AF65-F5344CB8AC3E}">
         <p14:creationId xmlns:p14="http://schemas.microsoft.com/office/powerpoint/2010/main" val="617657722"/>
+      </p:ext>
+    </p:extLst>
+  </p:cSld>
+  <p:clrMapOvr>
+    <a:masterClrMapping/>
+  </p:clrMapOvr>
+</p:notes>
+</file>
+
+<file path=ppt/notesSlides/notesSlide8.xml><?xml version="1.0" encoding="utf-8"?>
+<p:notes xmlns:a="http://schemas.openxmlformats.org/drawingml/2006/main" xmlns:r="http://schemas.openxmlformats.org/officeDocument/2006/relationships" xmlns:p="http://schemas.openxmlformats.org/presentationml/2006/main">
+  <p:cSld>
+    <p:spTree>
+      <p:nvGrpSpPr>
+        <p:cNvPr id="1" name=""/>
+        <p:cNvGrpSpPr/>
+        <p:nvPr/>
+      </p:nvGrpSpPr>
+      <p:grpSpPr>
+        <a:xfrm>
+          <a:off x="0" y="0"/>
+          <a:ext cx="0" cy="0"/>
+          <a:chOff x="0" y="0"/>
+          <a:chExt cx="0" cy="0"/>
+        </a:xfrm>
+      </p:grpSpPr>
+      <p:sp>
+        <p:nvSpPr>
+          <p:cNvPr id="2" name="Slide Image Placeholder 1"/>
+          <p:cNvSpPr>
+            <a:spLocks noGrp="1" noRot="1" noChangeAspect="1"/>
+          </p:cNvSpPr>
+          <p:nvPr>
+            <p:ph type="sldImg"/>
+          </p:nvPr>
+        </p:nvSpPr>
+        <p:spPr/>
+      </p:sp>
+      <p:sp>
+        <p:nvSpPr>
+          <p:cNvPr id="3" name="Notes Placeholder 2"/>
+          <p:cNvSpPr>
+            <a:spLocks noGrp="1"/>
+          </p:cNvSpPr>
+          <p:nvPr>
+            <p:ph type="body" idx="1"/>
+          </p:nvPr>
+        </p:nvSpPr>
+        <p:spPr/>
+        <p:txBody>
+          <a:bodyPr/>
+          <a:lstStyle/>
+          <a:p>
+            <a:r>
+              <a:rPr lang="sv-SE" dirty="0" smtClean="0"/>
+              <a:t>Example projects with repo</a:t>
+            </a:r>
+            <a:endParaRPr lang="sv-SE" dirty="0"/>
+          </a:p>
+        </p:txBody>
+      </p:sp>
+      <p:sp>
+        <p:nvSpPr>
+          <p:cNvPr id="4" name="Slide Number Placeholder 3"/>
+          <p:cNvSpPr>
+            <a:spLocks noGrp="1"/>
+          </p:cNvSpPr>
+          <p:nvPr>
+            <p:ph type="sldNum" sz="quarter" idx="10"/>
+          </p:nvPr>
+        </p:nvSpPr>
+        <p:spPr/>
+        <p:txBody>
+          <a:bodyPr/>
+          <a:lstStyle/>
+          <a:p>
+            <a:fld id="{4AC1C784-466F-4ABA-A6E5-D6D202D28610}" type="slidenum">
+              <a:rPr lang="sv-SE" smtClean="0"/>
+              <a:t>9</a:t>
+            </a:fld>
+            <a:endParaRPr lang="sv-SE"/>
+          </a:p>
+        </p:txBody>
+      </p:sp>
+    </p:spTree>
+    <p:extLst>
+      <p:ext uri="{BB962C8B-B14F-4D97-AF65-F5344CB8AC3E}">
+        <p14:creationId xmlns:p14="http://schemas.microsoft.com/office/powerpoint/2010/main" val="441558555"/>
       </p:ext>
     </p:extLst>
   </p:cSld>
@@ -3363,25 +4056,35 @@
           </a:p>
         </p:txBody>
       </p:sp>
-      <p:sp>
-        <p:nvSpPr>
-          <p:cNvPr id="3" name="Content Placeholder 2"/>
-          <p:cNvSpPr>
-            <a:spLocks noGrp="1"/>
-          </p:cNvSpPr>
+      <p:pic>
+        <p:nvPicPr>
+          <p:cNvPr id="4" name="Content Placeholder 3"/>
+          <p:cNvPicPr>
+            <a:picLocks noGrp="1" noChangeAspect="1"/>
+          </p:cNvPicPr>
           <p:nvPr>
             <p:ph idx="1"/>
           </p:nvPr>
-        </p:nvSpPr>
-        <p:spPr/>
-        <p:txBody>
-          <a:bodyPr/>
-          <a:lstStyle/>
-          <a:p>
-            <a:endParaRPr lang="sv-SE"/>
-          </a:p>
-        </p:txBody>
-      </p:sp>
+        </p:nvPicPr>
+        <p:blipFill>
+          <a:blip r:embed="rId3" cstate="print">
+            <a:extLst>
+              <a:ext uri="{28A0092B-C50C-407E-A947-70E740481C1C}">
+                <a14:useLocalDpi xmlns:a14="http://schemas.microsoft.com/office/drawing/2010/main" val="0"/>
+              </a:ext>
+            </a:extLst>
+          </a:blip>
+          <a:stretch>
+            <a:fillRect/>
+          </a:stretch>
+        </p:blipFill>
+        <p:spPr>
+          <a:xfrm>
+            <a:off x="971600" y="1268760"/>
+            <a:ext cx="7200800" cy="4838038"/>
+          </a:xfrm>
+        </p:spPr>
+      </p:pic>
     </p:spTree>
     <p:extLst>
       <p:ext uri="{BB962C8B-B14F-4D97-AF65-F5344CB8AC3E}">
@@ -3446,7 +4149,7 @@
       <p:pic>
         <p:nvPicPr>
           <p:cNvPr id="4" name="Content Placeholder 3">
-            <a:hlinkClick r:id="rId2"/>
+            <a:hlinkClick r:id="rId3"/>
           </p:cNvPr>
           <p:cNvPicPr>
             <a:picLocks noGrp="1" noChangeAspect="1"/>
@@ -3456,7 +4159,7 @@
           </p:nvPr>
         </p:nvPicPr>
         <p:blipFill rotWithShape="1">
-          <a:blip r:embed="rId3" cstate="print">
+          <a:blip r:embed="rId4" cstate="print">
             <a:extLst>
               <a:ext uri="{28A0092B-C50C-407E-A947-70E740481C1C}">
                 <a14:useLocalDpi xmlns:a14="http://schemas.microsoft.com/office/drawing/2010/main" val="0"/>
@@ -3534,25 +4237,35 @@
           </a:p>
         </p:txBody>
       </p:sp>
-      <p:sp>
-        <p:nvSpPr>
-          <p:cNvPr id="3" name="Content Placeholder 2"/>
-          <p:cNvSpPr>
-            <a:spLocks noGrp="1"/>
-          </p:cNvSpPr>
+      <p:pic>
+        <p:nvPicPr>
+          <p:cNvPr id="4" name="Content Placeholder 3"/>
+          <p:cNvPicPr>
+            <a:picLocks noGrp="1" noChangeAspect="1"/>
+          </p:cNvPicPr>
           <p:nvPr>
             <p:ph idx="1"/>
           </p:nvPr>
-        </p:nvSpPr>
-        <p:spPr/>
-        <p:txBody>
-          <a:bodyPr/>
-          <a:lstStyle/>
-          <a:p>
-            <a:endParaRPr lang="sv-SE"/>
-          </a:p>
-        </p:txBody>
-      </p:sp>
+        </p:nvPicPr>
+        <p:blipFill>
+          <a:blip r:embed="rId3" cstate="print">
+            <a:extLst>
+              <a:ext uri="{28A0092B-C50C-407E-A947-70E740481C1C}">
+                <a14:useLocalDpi xmlns:a14="http://schemas.microsoft.com/office/drawing/2010/main" val="0"/>
+              </a:ext>
+            </a:extLst>
+          </a:blip>
+          <a:stretch>
+            <a:fillRect/>
+          </a:stretch>
+        </p:blipFill>
+        <p:spPr>
+          <a:xfrm>
+            <a:off x="1259632" y="1268760"/>
+            <a:ext cx="6624736" cy="4929735"/>
+          </a:xfrm>
+        </p:spPr>
+      </p:pic>
     </p:spTree>
     <p:extLst>
       <p:ext uri="{BB962C8B-B14F-4D97-AF65-F5344CB8AC3E}">
@@ -3608,7 +4321,7 @@
           <a:p>
             <a:r>
               <a:rPr lang="sv-SE" dirty="0" smtClean="0"/>
-              <a:t>Taking a Picture</a:t>
+              <a:t>Move within an application</a:t>
             </a:r>
             <a:endParaRPr lang="sv-SE" dirty="0"/>
           </a:p>
@@ -3638,12 +4351,16 @@
               <a:buNone/>
             </a:pPr>
             <a:r>
+              <a:rPr lang="sv-SE" dirty="0"/>
+              <a:t>new </a:t>
+            </a:r>
+            <a:r>
               <a:rPr lang="sv-SE" dirty="0" smtClean="0"/>
-              <a:t>new </a:t>
+              <a:t>Intent(MainActivity.this, FooActivity.class</a:t>
             </a:r>
             <a:r>
               <a:rPr lang="sv-SE" dirty="0"/>
-              <a:t>Intent(MediaStore.ACTION_IMAGE_CAPTURE);</a:t>
+              <a:t>);</a:t>
             </a:r>
           </a:p>
         </p:txBody>
@@ -3703,7 +4420,7 @@
           <a:p>
             <a:r>
               <a:rPr lang="sv-SE" dirty="0" smtClean="0"/>
-              <a:t>Barcode Scanner</a:t>
+              <a:t>Taking a Picture</a:t>
             </a:r>
             <a:endParaRPr lang="sv-SE" dirty="0"/>
           </a:p>
@@ -3721,8 +4438,8 @@
         </p:nvSpPr>
         <p:spPr>
           <a:xfrm>
-            <a:off x="900708" y="3176972"/>
-            <a:ext cx="7342584" cy="504056"/>
+            <a:off x="540668" y="3212976"/>
+            <a:ext cx="8062664" cy="432048"/>
           </a:xfrm>
         </p:spPr>
         <p:txBody>
@@ -3733,17 +4450,20 @@
               <a:buNone/>
             </a:pPr>
             <a:r>
+              <a:rPr lang="sv-SE" dirty="0" smtClean="0"/>
+              <a:t>new </a:t>
+            </a:r>
+            <a:r>
               <a:rPr lang="sv-SE" dirty="0"/>
-              <a:t>new Intent("com.google.zxing.client.android.SCAN");</a:t>
-            </a:r>
-            <a:endParaRPr lang="sv-SE" dirty="0"/>
+              <a:t>Intent(MediaStore.ACTION_IMAGE_CAPTURE);</a:t>
+            </a:r>
           </a:p>
         </p:txBody>
       </p:sp>
     </p:spTree>
     <p:extLst>
       <p:ext uri="{BB962C8B-B14F-4D97-AF65-F5344CB8AC3E}">
-        <p14:creationId xmlns:p14="http://schemas.microsoft.com/office/powerpoint/2010/main" val="2163674846"/>
+        <p14:creationId xmlns:p14="http://schemas.microsoft.com/office/powerpoint/2010/main" val="3480627449"/>
       </p:ext>
     </p:extLst>
   </p:cSld>
@@ -3795,6 +4515,97 @@
           <a:p>
             <a:r>
               <a:rPr lang="sv-SE" dirty="0" smtClean="0"/>
+              <a:t>Barcode Scanner</a:t>
+            </a:r>
+            <a:endParaRPr lang="sv-SE" dirty="0"/>
+          </a:p>
+        </p:txBody>
+      </p:sp>
+      <p:sp>
+        <p:nvSpPr>
+          <p:cNvPr id="3" name="Content Placeholder 2"/>
+          <p:cNvSpPr>
+            <a:spLocks noGrp="1"/>
+          </p:cNvSpPr>
+          <p:nvPr>
+            <p:ph idx="1"/>
+          </p:nvPr>
+        </p:nvSpPr>
+        <p:spPr>
+          <a:xfrm>
+            <a:off x="900708" y="3176972"/>
+            <a:ext cx="7342584" cy="504056"/>
+          </a:xfrm>
+        </p:spPr>
+        <p:txBody>
+          <a:bodyPr/>
+          <a:lstStyle/>
+          <a:p>
+            <a:pPr marL="0" indent="0" algn="ctr">
+              <a:buNone/>
+            </a:pPr>
+            <a:r>
+              <a:rPr lang="sv-SE" dirty="0"/>
+              <a:t>new Intent("com.google.zxing.client.android.SCAN");</a:t>
+            </a:r>
+          </a:p>
+        </p:txBody>
+      </p:sp>
+    </p:spTree>
+    <p:extLst>
+      <p:ext uri="{BB962C8B-B14F-4D97-AF65-F5344CB8AC3E}">
+        <p14:creationId xmlns:p14="http://schemas.microsoft.com/office/powerpoint/2010/main" val="2163674846"/>
+      </p:ext>
+    </p:extLst>
+  </p:cSld>
+  <p:clrMapOvr>
+    <a:masterClrMapping/>
+  </p:clrMapOvr>
+  <p:transition/>
+  <p:timing>
+    <p:tnLst>
+      <p:par>
+        <p:cTn id="1" dur="indefinite" restart="never" nodeType="tmRoot"/>
+      </p:par>
+    </p:tnLst>
+  </p:timing>
+</p:sld>
+</file>
+
+<file path=ppt/slides/slide9.xml><?xml version="1.0" encoding="utf-8"?>
+<p:sld xmlns:a="http://schemas.openxmlformats.org/drawingml/2006/main" xmlns:r="http://schemas.openxmlformats.org/officeDocument/2006/relationships" xmlns:p="http://schemas.openxmlformats.org/presentationml/2006/main">
+  <p:cSld>
+    <p:spTree>
+      <p:nvGrpSpPr>
+        <p:cNvPr id="1" name=""/>
+        <p:cNvGrpSpPr/>
+        <p:nvPr/>
+      </p:nvGrpSpPr>
+      <p:grpSpPr>
+        <a:xfrm>
+          <a:off x="0" y="0"/>
+          <a:ext cx="0" cy="0"/>
+          <a:chOff x="0" y="0"/>
+          <a:chExt cx="0" cy="0"/>
+        </a:xfrm>
+      </p:grpSpPr>
+      <p:sp>
+        <p:nvSpPr>
+          <p:cNvPr id="2" name="Title 1"/>
+          <p:cNvSpPr>
+            <a:spLocks noGrp="1"/>
+          </p:cNvSpPr>
+          <p:nvPr>
+            <p:ph type="title"/>
+          </p:nvPr>
+        </p:nvSpPr>
+        <p:spPr/>
+        <p:txBody>
+          <a:bodyPr/>
+          <a:lstStyle/>
+          <a:p>
+            <a:r>
+              <a:rPr lang="sv-SE" dirty="0" smtClean="0"/>
               <a:t>Questions?</a:t>
             </a:r>
             <a:br>
@@ -3815,7 +4626,7 @@
           </p:nvPr>
         </p:nvPicPr>
         <p:blipFill>
-          <a:blip r:embed="rId2" cstate="print">
+          <a:blip r:embed="rId3" cstate="print">
             <a:extLst>
               <a:ext uri="{28A0092B-C50C-407E-A947-70E740481C1C}">
                 <a14:useLocalDpi xmlns:a14="http://schemas.microsoft.com/office/drawing/2010/main" val="0"/>

</xml_diff>